<commit_message>
Added Project Update slides for 26Mar18
Updated info on some slides
</commit_message>
<xml_diff>
--- a/SGW Project Update 28Mar18.pptx
+++ b/SGW Project Update 28Mar18.pptx
@@ -783,32 +783,12 @@
               <a:buChar char="―"/>
             </a:pPr>
             <a:r>
-              <a:rPr lang="en-US" sz="1400" dirty="0" smtClean="0"/>
-              <a:t>Alex had</a:t>
-            </a:r>
-            <a:r>
               <a:rPr lang="en-US" sz="1400" baseline="0" dirty="0" smtClean="0"/>
-              <a:t> just demonstrated the mobile capacity of the rebuilt website.</a:t>
-            </a:r>
-          </a:p>
-          <a:p>
-            <a:pPr marL="182880" indent="-182880">
-              <a:buFont typeface="Calibri" panose="020F0502020204030204" pitchFamily="34" charset="0"/>
-              <a:buChar char="―"/>
-            </a:pPr>
+              <a:t>Since </a:t>
+            </a:r>
             <a:r>
               <a:rPr lang="en-US" sz="1400" baseline="0" dirty="0" smtClean="0"/>
-              <a:t>I will also present some screenshots of how we satisfied the mobile-friendly requirement for the Volunteer App.</a:t>
-            </a:r>
-          </a:p>
-          <a:p>
-            <a:pPr marL="182880" indent="-182880">
-              <a:buFont typeface="Calibri" panose="020F0502020204030204" pitchFamily="34" charset="0"/>
-              <a:buChar char="―"/>
-            </a:pPr>
-            <a:r>
-              <a:rPr lang="en-US" sz="1400" baseline="0" dirty="0" smtClean="0"/>
-              <a:t>Since the client had chosen for our team to rebuild the existing app as stand-alone, we’ve made the following improvements to it:</a:t>
+              <a:t>the client had chosen for our team to rebuild the existing app as stand-alone, we’ve made the following improvements to it:</a:t>
             </a:r>
           </a:p>
           <a:p>
@@ -936,7 +916,15 @@
           <a:p>
             <a:r>
               <a:rPr lang="en-US" sz="1400" dirty="0" smtClean="0"/>
-              <a:t>This solution is pretty much done as it is able to support the Create, Read, Update, and Delete functions with each registered user of the app.  I’m just working on the “Total Hours” function using a PHP script on the Volunteer Hours Report page and cleaning up the rest of the pages for our final presentation.</a:t>
+              <a:t>This solution is pretty much done as it is able to support the Create, Read, Update, and Delete functions with each registered user of the app.  </a:t>
+            </a:r>
+            <a:r>
+              <a:rPr lang="en-US" sz="1400" dirty="0" smtClean="0"/>
+              <a:t>We’re </a:t>
+            </a:r>
+            <a:r>
+              <a:rPr lang="en-US" sz="1400" dirty="0" smtClean="0"/>
+              <a:t>just working on the “Total Hours” function using a PHP script on the Volunteer Hours Report page and cleaning up the rest of the pages for our final presentation.</a:t>
             </a:r>
             <a:endParaRPr lang="en-US" sz="1400" dirty="0"/>
           </a:p>
@@ -1399,21 +1387,7 @@
             </a:pPr>
             <a:r>
               <a:rPr lang="en-US" dirty="0" smtClean="0"/>
-              <a:t>We’ve</a:t>
-            </a:r>
-            <a:r>
-              <a:rPr lang="en-US" baseline="0" dirty="0" smtClean="0"/>
-              <a:t> completed the site and app rebuild.  We’re just finishing up on cleaning each site page and testing the app.</a:t>
-            </a:r>
-          </a:p>
-          <a:p>
-            <a:pPr marL="171450" indent="-171450">
-              <a:buFont typeface="Calibri" panose="020F0502020204030204" pitchFamily="34" charset="0"/>
-              <a:buChar char="―"/>
-            </a:pPr>
-            <a:r>
-              <a:rPr lang="en-US" baseline="0" dirty="0" smtClean="0"/>
-              <a:t>We’ve started our documentation task a few days ago which brings me to our Next Tasks on the next slide.</a:t>
+              <a:t>xx</a:t>
             </a:r>
             <a:endParaRPr lang="en-US" dirty="0"/>
           </a:p>
@@ -1499,9 +1473,26 @@
           <a:bodyPr/>
           <a:lstStyle/>
           <a:p>
+            <a:pPr marL="171450" marR="0" lvl="0" indent="-171450" algn="l" defTabSz="914400" rtl="0" eaLnBrk="1" fontAlgn="auto" latinLnBrk="0" hangingPunct="1">
+              <a:lnSpc>
+                <a:spcPct val="100000"/>
+              </a:lnSpc>
+              <a:spcBef>
+                <a:spcPts val="0"/>
+              </a:spcBef>
+              <a:spcAft>
+                <a:spcPts val="0"/>
+              </a:spcAft>
+              <a:buClrTx/>
+              <a:buSzTx/>
+              <a:buFont typeface="Calibri" panose="020F0502020204030204" pitchFamily="34" charset="0"/>
+              <a:buChar char="―"/>
+              <a:tabLst/>
+              <a:defRPr/>
+            </a:pPr>
             <a:r>
               <a:rPr lang="en-US" dirty="0" smtClean="0"/>
-              <a:t>briefly talk about the documentation and video tutorials that our team is already in the process of developing with major focus on those critical tasks</a:t>
+              <a:t>Briefly talk about the documentation and video tutorials that our team is already in the process of developing</a:t>
             </a:r>
             <a:endParaRPr lang="en-US" dirty="0"/>
           </a:p>
@@ -5328,31 +5319,7 @@
                 </a:solidFill>
                 <a:latin typeface="Calibri" panose="020F0502020204030204" pitchFamily="34" charset="0"/>
               </a:rPr>
-              <a:t>March </a:t>
-            </a:r>
-            <a:r>
-              <a:rPr lang="en-US" b="1" dirty="0" smtClean="0">
-                <a:solidFill>
-                  <a:schemeClr val="tx1">
-                    <a:lumMod val="75000"/>
-                    <a:lumOff val="25000"/>
-                  </a:schemeClr>
-                </a:solidFill>
-                <a:latin typeface="Calibri" panose="020F0502020204030204" pitchFamily="34" charset="0"/>
-              </a:rPr>
-              <a:t>28, </a:t>
-            </a:r>
-            <a:r>
-              <a:rPr lang="en-US" b="1" dirty="0" smtClean="0">
-                <a:solidFill>
-                  <a:schemeClr val="tx1">
-                    <a:lumMod val="75000"/>
-                    <a:lumOff val="25000"/>
-                  </a:schemeClr>
-                </a:solidFill>
-                <a:latin typeface="Calibri" panose="020F0502020204030204" pitchFamily="34" charset="0"/>
-              </a:rPr>
-              <a:t>2018</a:t>
+              <a:t>March 28, 2018</a:t>
             </a:r>
             <a:endParaRPr kumimoji="0" lang="en-US" sz="2400" b="1" i="0" u="none" strike="noStrike" kern="1200" cap="none" spc="0" normalizeH="0" baseline="0" noProof="0" dirty="0">
               <a:ln>
@@ -6003,11 +5970,7 @@
             </a:pPr>
             <a:r>
               <a:rPr lang="en-US" sz="3000" dirty="0" smtClean="0"/>
-              <a:t>Added </a:t>
-            </a:r>
-            <a:r>
-              <a:rPr lang="en-US" sz="3000" dirty="0" smtClean="0"/>
-              <a:t>Login Name in each page</a:t>
+              <a:t>Added Login Name in each page</a:t>
             </a:r>
           </a:p>
           <a:p>
@@ -6037,13 +6000,8 @@
             </a:pPr>
             <a:r>
               <a:rPr lang="en-US" sz="3000" dirty="0" smtClean="0"/>
-              <a:t>Updated app from PHP 5.6 to </a:t>
-            </a:r>
-            <a:r>
-              <a:rPr lang="en-US" sz="3000" dirty="0" smtClean="0"/>
-              <a:t>7.2</a:t>
-            </a:r>
-            <a:endParaRPr lang="en-US" sz="3000" dirty="0" smtClean="0"/>
+              <a:t>Updated app from PHP 5.6 to 7.2</a:t>
+            </a:r>
           </a:p>
         </p:txBody>
       </p:sp>
@@ -6539,11 +6497,7 @@
           <a:p>
             <a:r>
               <a:rPr lang="en-US" sz="3600" dirty="0" smtClean="0"/>
-              <a:t>Project </a:t>
-            </a:r>
-            <a:r>
-              <a:rPr lang="en-US" sz="3600" dirty="0" smtClean="0"/>
-              <a:t>Schedule </a:t>
+              <a:t>Project Schedule </a:t>
             </a:r>
           </a:p>
           <a:p>
@@ -7107,11 +7061,7 @@
             </a:pPr>
             <a:r>
               <a:rPr lang="en-US" dirty="0" smtClean="0"/>
-              <a:t>Case #1:  </a:t>
-            </a:r>
-            <a:r>
-              <a:rPr lang="en-US" dirty="0" smtClean="0"/>
-              <a:t>Site Navigation Menu and Hyperlinks</a:t>
+              <a:t>Case #1:  Site Navigation Menu and Hyperlinks</a:t>
             </a:r>
             <a:endParaRPr lang="en-US" dirty="0"/>
           </a:p>
@@ -7179,7 +7129,6 @@
               <a:rPr lang="en-US" dirty="0" smtClean="0"/>
               <a:t>Update</a:t>
             </a:r>
-            <a:endParaRPr lang="en-US" dirty="0" smtClean="0"/>
           </a:p>
           <a:p>
             <a:pPr>
@@ -7203,11 +7152,7 @@
             </a:pPr>
             <a:r>
               <a:rPr lang="en-US" dirty="0" smtClean="0"/>
-              <a:t>Case #1</a:t>
-            </a:r>
-            <a:r>
-              <a:rPr lang="en-US" dirty="0" smtClean="0"/>
-              <a:t>:  App Navigation Menu and Hyperlinks</a:t>
+              <a:t>Case #1:  App Navigation Menu and Hyperlinks</a:t>
             </a:r>
             <a:endParaRPr lang="en-US" dirty="0"/>
           </a:p>
@@ -7225,11 +7170,7 @@
             </a:r>
             <a:r>
               <a:rPr lang="en-US" dirty="0"/>
-              <a:t>#2:  </a:t>
-            </a:r>
-            <a:r>
-              <a:rPr lang="en-US" dirty="0"/>
-              <a:t>Registration and Login </a:t>
+              <a:t>#2:  Registration and Login </a:t>
             </a:r>
             <a:r>
               <a:rPr lang="en-US" dirty="0" smtClean="0"/>
@@ -7250,11 +7191,7 @@
             </a:r>
             <a:r>
               <a:rPr lang="en-US" dirty="0"/>
-              <a:t>#3:  </a:t>
-            </a:r>
-            <a:r>
-              <a:rPr lang="en-US" dirty="0"/>
-              <a:t>Create </a:t>
+              <a:t>#3:  Create </a:t>
             </a:r>
             <a:r>
               <a:rPr lang="en-US" dirty="0" smtClean="0"/>
@@ -7275,11 +7212,7 @@
             </a:r>
             <a:r>
               <a:rPr lang="en-US" dirty="0"/>
-              <a:t>#4:  </a:t>
-            </a:r>
-            <a:r>
-              <a:rPr lang="en-US" dirty="0"/>
-              <a:t>Read </a:t>
+              <a:t>#4:  Read </a:t>
             </a:r>
             <a:r>
               <a:rPr lang="en-US" dirty="0" smtClean="0"/>
@@ -7324,7 +7257,6 @@
               <a:rPr lang="en-US" dirty="0"/>
               <a:t>Delete Record</a:t>
             </a:r>
-            <a:endParaRPr lang="en-US" dirty="0"/>
           </a:p>
           <a:p>
             <a:pPr lvl="1">
@@ -7553,13 +7485,8 @@
             </a:pPr>
             <a:r>
               <a:rPr lang="en-US" dirty="0" smtClean="0"/>
-              <a:t>Finish </a:t>
-            </a:r>
-            <a:r>
-              <a:rPr lang="en-US" dirty="0" smtClean="0"/>
-              <a:t>Documentation &amp; Video Tutorials</a:t>
-            </a:r>
-            <a:endParaRPr lang="en-US" dirty="0" smtClean="0"/>
+              <a:t>Finish Documentation &amp; Video Tutorials</a:t>
+            </a:r>
           </a:p>
           <a:p>
             <a:pPr>
@@ -7571,7 +7498,6 @@
               <a:rPr lang="en-US" dirty="0" smtClean="0"/>
               <a:t>Deploy Website &amp; App on ~April 4th</a:t>
             </a:r>
-            <a:endParaRPr lang="en-US" dirty="0" smtClean="0"/>
           </a:p>
           <a:p>
             <a:pPr>

</xml_diff>

<commit_message>
Revert "Added Project Update slides for 26Mar18"
This reverts commit 6fec8a0404467dcc0ca5266ea6fcfd6f7912d811.
</commit_message>
<xml_diff>
--- a/SGW Project Update 28Mar18.pptx
+++ b/SGW Project Update 28Mar18.pptx
@@ -783,12 +783,32 @@
               <a:buChar char="―"/>
             </a:pPr>
             <a:r>
+              <a:rPr lang="en-US" sz="1400" dirty="0" smtClean="0"/>
+              <a:t>Alex had</a:t>
+            </a:r>
+            <a:r>
               <a:rPr lang="en-US" sz="1400" baseline="0" dirty="0" smtClean="0"/>
-              <a:t>Since </a:t>
-            </a:r>
+              <a:t> just demonstrated the mobile capacity of the rebuilt website.</a:t>
+            </a:r>
+          </a:p>
+          <a:p>
+            <a:pPr marL="182880" indent="-182880">
+              <a:buFont typeface="Calibri" panose="020F0502020204030204" pitchFamily="34" charset="0"/>
+              <a:buChar char="―"/>
+            </a:pPr>
             <a:r>
               <a:rPr lang="en-US" sz="1400" baseline="0" dirty="0" smtClean="0"/>
-              <a:t>the client had chosen for our team to rebuild the existing app as stand-alone, we’ve made the following improvements to it:</a:t>
+              <a:t>I will also present some screenshots of how we satisfied the mobile-friendly requirement for the Volunteer App.</a:t>
+            </a:r>
+          </a:p>
+          <a:p>
+            <a:pPr marL="182880" indent="-182880">
+              <a:buFont typeface="Calibri" panose="020F0502020204030204" pitchFamily="34" charset="0"/>
+              <a:buChar char="―"/>
+            </a:pPr>
+            <a:r>
+              <a:rPr lang="en-US" sz="1400" baseline="0" dirty="0" smtClean="0"/>
+              <a:t>Since the client had chosen for our team to rebuild the existing app as stand-alone, we’ve made the following improvements to it:</a:t>
             </a:r>
           </a:p>
           <a:p>
@@ -916,15 +936,7 @@
           <a:p>
             <a:r>
               <a:rPr lang="en-US" sz="1400" dirty="0" smtClean="0"/>
-              <a:t>This solution is pretty much done as it is able to support the Create, Read, Update, and Delete functions with each registered user of the app.  </a:t>
-            </a:r>
-            <a:r>
-              <a:rPr lang="en-US" sz="1400" dirty="0" smtClean="0"/>
-              <a:t>We’re </a:t>
-            </a:r>
-            <a:r>
-              <a:rPr lang="en-US" sz="1400" dirty="0" smtClean="0"/>
-              <a:t>just working on the “Total Hours” function using a PHP script on the Volunteer Hours Report page and cleaning up the rest of the pages for our final presentation.</a:t>
+              <a:t>This solution is pretty much done as it is able to support the Create, Read, Update, and Delete functions with each registered user of the app.  I’m just working on the “Total Hours” function using a PHP script on the Volunteer Hours Report page and cleaning up the rest of the pages for our final presentation.</a:t>
             </a:r>
             <a:endParaRPr lang="en-US" sz="1400" dirty="0"/>
           </a:p>
@@ -1387,7 +1399,21 @@
             </a:pPr>
             <a:r>
               <a:rPr lang="en-US" dirty="0" smtClean="0"/>
-              <a:t>xx</a:t>
+              <a:t>We’ve</a:t>
+            </a:r>
+            <a:r>
+              <a:rPr lang="en-US" baseline="0" dirty="0" smtClean="0"/>
+              <a:t> completed the site and app rebuild.  We’re just finishing up on cleaning each site page and testing the app.</a:t>
+            </a:r>
+          </a:p>
+          <a:p>
+            <a:pPr marL="171450" indent="-171450">
+              <a:buFont typeface="Calibri" panose="020F0502020204030204" pitchFamily="34" charset="0"/>
+              <a:buChar char="―"/>
+            </a:pPr>
+            <a:r>
+              <a:rPr lang="en-US" baseline="0" dirty="0" smtClean="0"/>
+              <a:t>We’ve started our documentation task a few days ago which brings me to our Next Tasks on the next slide.</a:t>
             </a:r>
             <a:endParaRPr lang="en-US" dirty="0"/>
           </a:p>
@@ -1473,26 +1499,9 @@
           <a:bodyPr/>
           <a:lstStyle/>
           <a:p>
-            <a:pPr marL="171450" marR="0" lvl="0" indent="-171450" algn="l" defTabSz="914400" rtl="0" eaLnBrk="1" fontAlgn="auto" latinLnBrk="0" hangingPunct="1">
-              <a:lnSpc>
-                <a:spcPct val="100000"/>
-              </a:lnSpc>
-              <a:spcBef>
-                <a:spcPts val="0"/>
-              </a:spcBef>
-              <a:spcAft>
-                <a:spcPts val="0"/>
-              </a:spcAft>
-              <a:buClrTx/>
-              <a:buSzTx/>
-              <a:buFont typeface="Calibri" panose="020F0502020204030204" pitchFamily="34" charset="0"/>
-              <a:buChar char="―"/>
-              <a:tabLst/>
-              <a:defRPr/>
-            </a:pPr>
             <a:r>
               <a:rPr lang="en-US" dirty="0" smtClean="0"/>
-              <a:t>Briefly talk about the documentation and video tutorials that our team is already in the process of developing</a:t>
+              <a:t>briefly talk about the documentation and video tutorials that our team is already in the process of developing with major focus on those critical tasks</a:t>
             </a:r>
             <a:endParaRPr lang="en-US" dirty="0"/>
           </a:p>
@@ -5319,7 +5328,31 @@
                 </a:solidFill>
                 <a:latin typeface="Calibri" panose="020F0502020204030204" pitchFamily="34" charset="0"/>
               </a:rPr>
-              <a:t>March 28, 2018</a:t>
+              <a:t>March </a:t>
+            </a:r>
+            <a:r>
+              <a:rPr lang="en-US" b="1" dirty="0" smtClean="0">
+                <a:solidFill>
+                  <a:schemeClr val="tx1">
+                    <a:lumMod val="75000"/>
+                    <a:lumOff val="25000"/>
+                  </a:schemeClr>
+                </a:solidFill>
+                <a:latin typeface="Calibri" panose="020F0502020204030204" pitchFamily="34" charset="0"/>
+              </a:rPr>
+              <a:t>28, </a:t>
+            </a:r>
+            <a:r>
+              <a:rPr lang="en-US" b="1" dirty="0" smtClean="0">
+                <a:solidFill>
+                  <a:schemeClr val="tx1">
+                    <a:lumMod val="75000"/>
+                    <a:lumOff val="25000"/>
+                  </a:schemeClr>
+                </a:solidFill>
+                <a:latin typeface="Calibri" panose="020F0502020204030204" pitchFamily="34" charset="0"/>
+              </a:rPr>
+              <a:t>2018</a:t>
             </a:r>
             <a:endParaRPr kumimoji="0" lang="en-US" sz="2400" b="1" i="0" u="none" strike="noStrike" kern="1200" cap="none" spc="0" normalizeH="0" baseline="0" noProof="0" dirty="0">
               <a:ln>
@@ -5970,7 +6003,11 @@
             </a:pPr>
             <a:r>
               <a:rPr lang="en-US" sz="3000" dirty="0" smtClean="0"/>
-              <a:t>Added Login Name in each page</a:t>
+              <a:t>Added </a:t>
+            </a:r>
+            <a:r>
+              <a:rPr lang="en-US" sz="3000" dirty="0" smtClean="0"/>
+              <a:t>Login Name in each page</a:t>
             </a:r>
           </a:p>
           <a:p>
@@ -6000,8 +6037,13 @@
             </a:pPr>
             <a:r>
               <a:rPr lang="en-US" sz="3000" dirty="0" smtClean="0"/>
-              <a:t>Updated app from PHP 5.6 to 7.2</a:t>
-            </a:r>
+              <a:t>Updated app from PHP 5.6 to </a:t>
+            </a:r>
+            <a:r>
+              <a:rPr lang="en-US" sz="3000" dirty="0" smtClean="0"/>
+              <a:t>7.2</a:t>
+            </a:r>
+            <a:endParaRPr lang="en-US" sz="3000" dirty="0" smtClean="0"/>
           </a:p>
         </p:txBody>
       </p:sp>
@@ -6497,7 +6539,11 @@
           <a:p>
             <a:r>
               <a:rPr lang="en-US" sz="3600" dirty="0" smtClean="0"/>
-              <a:t>Project Schedule </a:t>
+              <a:t>Project </a:t>
+            </a:r>
+            <a:r>
+              <a:rPr lang="en-US" sz="3600" dirty="0" smtClean="0"/>
+              <a:t>Schedule </a:t>
             </a:r>
           </a:p>
           <a:p>
@@ -7061,7 +7107,11 @@
             </a:pPr>
             <a:r>
               <a:rPr lang="en-US" dirty="0" smtClean="0"/>
-              <a:t>Case #1:  Site Navigation Menu and Hyperlinks</a:t>
+              <a:t>Case #1:  </a:t>
+            </a:r>
+            <a:r>
+              <a:rPr lang="en-US" dirty="0" smtClean="0"/>
+              <a:t>Site Navigation Menu and Hyperlinks</a:t>
             </a:r>
             <a:endParaRPr lang="en-US" dirty="0"/>
           </a:p>
@@ -7129,6 +7179,7 @@
               <a:rPr lang="en-US" dirty="0" smtClean="0"/>
               <a:t>Update</a:t>
             </a:r>
+            <a:endParaRPr lang="en-US" dirty="0" smtClean="0"/>
           </a:p>
           <a:p>
             <a:pPr>
@@ -7152,7 +7203,11 @@
             </a:pPr>
             <a:r>
               <a:rPr lang="en-US" dirty="0" smtClean="0"/>
-              <a:t>Case #1:  App Navigation Menu and Hyperlinks</a:t>
+              <a:t>Case #1</a:t>
+            </a:r>
+            <a:r>
+              <a:rPr lang="en-US" dirty="0" smtClean="0"/>
+              <a:t>:  App Navigation Menu and Hyperlinks</a:t>
             </a:r>
             <a:endParaRPr lang="en-US" dirty="0"/>
           </a:p>
@@ -7170,7 +7225,11 @@
             </a:r>
             <a:r>
               <a:rPr lang="en-US" dirty="0"/>
-              <a:t>#2:  Registration and Login </a:t>
+              <a:t>#2:  </a:t>
+            </a:r>
+            <a:r>
+              <a:rPr lang="en-US" dirty="0"/>
+              <a:t>Registration and Login </a:t>
             </a:r>
             <a:r>
               <a:rPr lang="en-US" dirty="0" smtClean="0"/>
@@ -7191,7 +7250,11 @@
             </a:r>
             <a:r>
               <a:rPr lang="en-US" dirty="0"/>
-              <a:t>#3:  Create </a:t>
+              <a:t>#3:  </a:t>
+            </a:r>
+            <a:r>
+              <a:rPr lang="en-US" dirty="0"/>
+              <a:t>Create </a:t>
             </a:r>
             <a:r>
               <a:rPr lang="en-US" dirty="0" smtClean="0"/>
@@ -7212,7 +7275,11 @@
             </a:r>
             <a:r>
               <a:rPr lang="en-US" dirty="0"/>
-              <a:t>#4:  Read </a:t>
+              <a:t>#4:  </a:t>
+            </a:r>
+            <a:r>
+              <a:rPr lang="en-US" dirty="0"/>
+              <a:t>Read </a:t>
             </a:r>
             <a:r>
               <a:rPr lang="en-US" dirty="0" smtClean="0"/>
@@ -7257,6 +7324,7 @@
               <a:rPr lang="en-US" dirty="0"/>
               <a:t>Delete Record</a:t>
             </a:r>
+            <a:endParaRPr lang="en-US" dirty="0"/>
           </a:p>
           <a:p>
             <a:pPr lvl="1">
@@ -7485,8 +7553,13 @@
             </a:pPr>
             <a:r>
               <a:rPr lang="en-US" dirty="0" smtClean="0"/>
-              <a:t>Finish Documentation &amp; Video Tutorials</a:t>
-            </a:r>
+              <a:t>Finish </a:t>
+            </a:r>
+            <a:r>
+              <a:rPr lang="en-US" dirty="0" smtClean="0"/>
+              <a:t>Documentation &amp; Video Tutorials</a:t>
+            </a:r>
+            <a:endParaRPr lang="en-US" dirty="0" smtClean="0"/>
           </a:p>
           <a:p>
             <a:pPr>
@@ -7498,6 +7571,7 @@
               <a:rPr lang="en-US" dirty="0" smtClean="0"/>
               <a:t>Deploy Website &amp; App on ~April 4th</a:t>
             </a:r>
+            <a:endParaRPr lang="en-US" dirty="0" smtClean="0"/>
           </a:p>
           <a:p>
             <a:pPr>

</xml_diff>

<commit_message>
Revert "Revert "Added Project Update slides for 26Mar18""
This reverts commit a055509c2944714de5501d9921808d9aab74f32b.
</commit_message>
<xml_diff>
--- a/SGW Project Update 28Mar18.pptx
+++ b/SGW Project Update 28Mar18.pptx
@@ -783,32 +783,12 @@
               <a:buChar char="―"/>
             </a:pPr>
             <a:r>
-              <a:rPr lang="en-US" sz="1400" dirty="0" smtClean="0"/>
-              <a:t>Alex had</a:t>
-            </a:r>
-            <a:r>
               <a:rPr lang="en-US" sz="1400" baseline="0" dirty="0" smtClean="0"/>
-              <a:t> just demonstrated the mobile capacity of the rebuilt website.</a:t>
-            </a:r>
-          </a:p>
-          <a:p>
-            <a:pPr marL="182880" indent="-182880">
-              <a:buFont typeface="Calibri" panose="020F0502020204030204" pitchFamily="34" charset="0"/>
-              <a:buChar char="―"/>
-            </a:pPr>
+              <a:t>Since </a:t>
+            </a:r>
             <a:r>
               <a:rPr lang="en-US" sz="1400" baseline="0" dirty="0" smtClean="0"/>
-              <a:t>I will also present some screenshots of how we satisfied the mobile-friendly requirement for the Volunteer App.</a:t>
-            </a:r>
-          </a:p>
-          <a:p>
-            <a:pPr marL="182880" indent="-182880">
-              <a:buFont typeface="Calibri" panose="020F0502020204030204" pitchFamily="34" charset="0"/>
-              <a:buChar char="―"/>
-            </a:pPr>
-            <a:r>
-              <a:rPr lang="en-US" sz="1400" baseline="0" dirty="0" smtClean="0"/>
-              <a:t>Since the client had chosen for our team to rebuild the existing app as stand-alone, we’ve made the following improvements to it:</a:t>
+              <a:t>the client had chosen for our team to rebuild the existing app as stand-alone, we’ve made the following improvements to it:</a:t>
             </a:r>
           </a:p>
           <a:p>
@@ -936,7 +916,15 @@
           <a:p>
             <a:r>
               <a:rPr lang="en-US" sz="1400" dirty="0" smtClean="0"/>
-              <a:t>This solution is pretty much done as it is able to support the Create, Read, Update, and Delete functions with each registered user of the app.  I’m just working on the “Total Hours” function using a PHP script on the Volunteer Hours Report page and cleaning up the rest of the pages for our final presentation.</a:t>
+              <a:t>This solution is pretty much done as it is able to support the Create, Read, Update, and Delete functions with each registered user of the app.  </a:t>
+            </a:r>
+            <a:r>
+              <a:rPr lang="en-US" sz="1400" dirty="0" smtClean="0"/>
+              <a:t>We’re </a:t>
+            </a:r>
+            <a:r>
+              <a:rPr lang="en-US" sz="1400" dirty="0" smtClean="0"/>
+              <a:t>just working on the “Total Hours” function using a PHP script on the Volunteer Hours Report page and cleaning up the rest of the pages for our final presentation.</a:t>
             </a:r>
             <a:endParaRPr lang="en-US" sz="1400" dirty="0"/>
           </a:p>
@@ -1399,21 +1387,7 @@
             </a:pPr>
             <a:r>
               <a:rPr lang="en-US" dirty="0" smtClean="0"/>
-              <a:t>We’ve</a:t>
-            </a:r>
-            <a:r>
-              <a:rPr lang="en-US" baseline="0" dirty="0" smtClean="0"/>
-              <a:t> completed the site and app rebuild.  We’re just finishing up on cleaning each site page and testing the app.</a:t>
-            </a:r>
-          </a:p>
-          <a:p>
-            <a:pPr marL="171450" indent="-171450">
-              <a:buFont typeface="Calibri" panose="020F0502020204030204" pitchFamily="34" charset="0"/>
-              <a:buChar char="―"/>
-            </a:pPr>
-            <a:r>
-              <a:rPr lang="en-US" baseline="0" dirty="0" smtClean="0"/>
-              <a:t>We’ve started our documentation task a few days ago which brings me to our Next Tasks on the next slide.</a:t>
+              <a:t>xx</a:t>
             </a:r>
             <a:endParaRPr lang="en-US" dirty="0"/>
           </a:p>
@@ -1499,9 +1473,26 @@
           <a:bodyPr/>
           <a:lstStyle/>
           <a:p>
+            <a:pPr marL="171450" marR="0" lvl="0" indent="-171450" algn="l" defTabSz="914400" rtl="0" eaLnBrk="1" fontAlgn="auto" latinLnBrk="0" hangingPunct="1">
+              <a:lnSpc>
+                <a:spcPct val="100000"/>
+              </a:lnSpc>
+              <a:spcBef>
+                <a:spcPts val="0"/>
+              </a:spcBef>
+              <a:spcAft>
+                <a:spcPts val="0"/>
+              </a:spcAft>
+              <a:buClrTx/>
+              <a:buSzTx/>
+              <a:buFont typeface="Calibri" panose="020F0502020204030204" pitchFamily="34" charset="0"/>
+              <a:buChar char="―"/>
+              <a:tabLst/>
+              <a:defRPr/>
+            </a:pPr>
             <a:r>
               <a:rPr lang="en-US" dirty="0" smtClean="0"/>
-              <a:t>briefly talk about the documentation and video tutorials that our team is already in the process of developing with major focus on those critical tasks</a:t>
+              <a:t>Briefly talk about the documentation and video tutorials that our team is already in the process of developing</a:t>
             </a:r>
             <a:endParaRPr lang="en-US" dirty="0"/>
           </a:p>
@@ -5328,31 +5319,7 @@
                 </a:solidFill>
                 <a:latin typeface="Calibri" panose="020F0502020204030204" pitchFamily="34" charset="0"/>
               </a:rPr>
-              <a:t>March </a:t>
-            </a:r>
-            <a:r>
-              <a:rPr lang="en-US" b="1" dirty="0" smtClean="0">
-                <a:solidFill>
-                  <a:schemeClr val="tx1">
-                    <a:lumMod val="75000"/>
-                    <a:lumOff val="25000"/>
-                  </a:schemeClr>
-                </a:solidFill>
-                <a:latin typeface="Calibri" panose="020F0502020204030204" pitchFamily="34" charset="0"/>
-              </a:rPr>
-              <a:t>28, </a:t>
-            </a:r>
-            <a:r>
-              <a:rPr lang="en-US" b="1" dirty="0" smtClean="0">
-                <a:solidFill>
-                  <a:schemeClr val="tx1">
-                    <a:lumMod val="75000"/>
-                    <a:lumOff val="25000"/>
-                  </a:schemeClr>
-                </a:solidFill>
-                <a:latin typeface="Calibri" panose="020F0502020204030204" pitchFamily="34" charset="0"/>
-              </a:rPr>
-              <a:t>2018</a:t>
+              <a:t>March 28, 2018</a:t>
             </a:r>
             <a:endParaRPr kumimoji="0" lang="en-US" sz="2400" b="1" i="0" u="none" strike="noStrike" kern="1200" cap="none" spc="0" normalizeH="0" baseline="0" noProof="0" dirty="0">
               <a:ln>
@@ -6003,11 +5970,7 @@
             </a:pPr>
             <a:r>
               <a:rPr lang="en-US" sz="3000" dirty="0" smtClean="0"/>
-              <a:t>Added </a:t>
-            </a:r>
-            <a:r>
-              <a:rPr lang="en-US" sz="3000" dirty="0" smtClean="0"/>
-              <a:t>Login Name in each page</a:t>
+              <a:t>Added Login Name in each page</a:t>
             </a:r>
           </a:p>
           <a:p>
@@ -6037,13 +6000,8 @@
             </a:pPr>
             <a:r>
               <a:rPr lang="en-US" sz="3000" dirty="0" smtClean="0"/>
-              <a:t>Updated app from PHP 5.6 to </a:t>
-            </a:r>
-            <a:r>
-              <a:rPr lang="en-US" sz="3000" dirty="0" smtClean="0"/>
-              <a:t>7.2</a:t>
-            </a:r>
-            <a:endParaRPr lang="en-US" sz="3000" dirty="0" smtClean="0"/>
+              <a:t>Updated app from PHP 5.6 to 7.2</a:t>
+            </a:r>
           </a:p>
         </p:txBody>
       </p:sp>
@@ -6539,11 +6497,7 @@
           <a:p>
             <a:r>
               <a:rPr lang="en-US" sz="3600" dirty="0" smtClean="0"/>
-              <a:t>Project </a:t>
-            </a:r>
-            <a:r>
-              <a:rPr lang="en-US" sz="3600" dirty="0" smtClean="0"/>
-              <a:t>Schedule </a:t>
+              <a:t>Project Schedule </a:t>
             </a:r>
           </a:p>
           <a:p>
@@ -7107,11 +7061,7 @@
             </a:pPr>
             <a:r>
               <a:rPr lang="en-US" dirty="0" smtClean="0"/>
-              <a:t>Case #1:  </a:t>
-            </a:r>
-            <a:r>
-              <a:rPr lang="en-US" dirty="0" smtClean="0"/>
-              <a:t>Site Navigation Menu and Hyperlinks</a:t>
+              <a:t>Case #1:  Site Navigation Menu and Hyperlinks</a:t>
             </a:r>
             <a:endParaRPr lang="en-US" dirty="0"/>
           </a:p>
@@ -7179,7 +7129,6 @@
               <a:rPr lang="en-US" dirty="0" smtClean="0"/>
               <a:t>Update</a:t>
             </a:r>
-            <a:endParaRPr lang="en-US" dirty="0" smtClean="0"/>
           </a:p>
           <a:p>
             <a:pPr>
@@ -7203,11 +7152,7 @@
             </a:pPr>
             <a:r>
               <a:rPr lang="en-US" dirty="0" smtClean="0"/>
-              <a:t>Case #1</a:t>
-            </a:r>
-            <a:r>
-              <a:rPr lang="en-US" dirty="0" smtClean="0"/>
-              <a:t>:  App Navigation Menu and Hyperlinks</a:t>
+              <a:t>Case #1:  App Navigation Menu and Hyperlinks</a:t>
             </a:r>
             <a:endParaRPr lang="en-US" dirty="0"/>
           </a:p>
@@ -7225,11 +7170,7 @@
             </a:r>
             <a:r>
               <a:rPr lang="en-US" dirty="0"/>
-              <a:t>#2:  </a:t>
-            </a:r>
-            <a:r>
-              <a:rPr lang="en-US" dirty="0"/>
-              <a:t>Registration and Login </a:t>
+              <a:t>#2:  Registration and Login </a:t>
             </a:r>
             <a:r>
               <a:rPr lang="en-US" dirty="0" smtClean="0"/>
@@ -7250,11 +7191,7 @@
             </a:r>
             <a:r>
               <a:rPr lang="en-US" dirty="0"/>
-              <a:t>#3:  </a:t>
-            </a:r>
-            <a:r>
-              <a:rPr lang="en-US" dirty="0"/>
-              <a:t>Create </a:t>
+              <a:t>#3:  Create </a:t>
             </a:r>
             <a:r>
               <a:rPr lang="en-US" dirty="0" smtClean="0"/>
@@ -7275,11 +7212,7 @@
             </a:r>
             <a:r>
               <a:rPr lang="en-US" dirty="0"/>
-              <a:t>#4:  </a:t>
-            </a:r>
-            <a:r>
-              <a:rPr lang="en-US" dirty="0"/>
-              <a:t>Read </a:t>
+              <a:t>#4:  Read </a:t>
             </a:r>
             <a:r>
               <a:rPr lang="en-US" dirty="0" smtClean="0"/>
@@ -7324,7 +7257,6 @@
               <a:rPr lang="en-US" dirty="0"/>
               <a:t>Delete Record</a:t>
             </a:r>
-            <a:endParaRPr lang="en-US" dirty="0"/>
           </a:p>
           <a:p>
             <a:pPr lvl="1">
@@ -7553,13 +7485,8 @@
             </a:pPr>
             <a:r>
               <a:rPr lang="en-US" dirty="0" smtClean="0"/>
-              <a:t>Finish </a:t>
-            </a:r>
-            <a:r>
-              <a:rPr lang="en-US" dirty="0" smtClean="0"/>
-              <a:t>Documentation &amp; Video Tutorials</a:t>
-            </a:r>
-            <a:endParaRPr lang="en-US" dirty="0" smtClean="0"/>
+              <a:t>Finish Documentation &amp; Video Tutorials</a:t>
+            </a:r>
           </a:p>
           <a:p>
             <a:pPr>
@@ -7571,7 +7498,6 @@
               <a:rPr lang="en-US" dirty="0" smtClean="0"/>
               <a:t>Deploy Website &amp; App on ~April 4th</a:t>
             </a:r>
-            <a:endParaRPr lang="en-US" dirty="0" smtClean="0"/>
           </a:p>
           <a:p>
             <a:pPr>

</xml_diff>

<commit_message>
Added Project Update slides for 28Mar18
Updated info on some slides
</commit_message>
<xml_diff>
--- a/SGW Project Update 28Mar18.pptx
+++ b/SGW Project Update 28Mar18.pptx
@@ -784,11 +784,7 @@
             </a:pPr>
             <a:r>
               <a:rPr lang="en-US" sz="1400" baseline="0" dirty="0" smtClean="0"/>
-              <a:t>Since </a:t>
-            </a:r>
-            <a:r>
-              <a:rPr lang="en-US" sz="1400" baseline="0" dirty="0" smtClean="0"/>
-              <a:t>the client had chosen for our team to rebuild the existing app as stand-alone, we’ve made the following improvements to it:</a:t>
+              <a:t>Since the client had chosen for our team to rebuild the existing app as stand-alone, we’ve made the following improvements to it:</a:t>
             </a:r>
           </a:p>
           <a:p>
@@ -916,15 +912,11 @@
           <a:p>
             <a:r>
               <a:rPr lang="en-US" sz="1400" dirty="0" smtClean="0"/>
-              <a:t>This solution is pretty much done as it is able to support the Create, Read, Update, and Delete functions with each registered user of the app.  </a:t>
+              <a:t>This solution is pretty much done as it is able to support the Create, Read, Update, and Delete functions with each registered user of the app.  We’re just working on the “Total Hours” function using a PHP script on the Volunteer Hours Report page and cleaning up the rest of the pages for our final presentation</a:t>
             </a:r>
             <a:r>
               <a:rPr lang="en-US" sz="1400" dirty="0" smtClean="0"/>
-              <a:t>We’re </a:t>
-            </a:r>
-            <a:r>
-              <a:rPr lang="en-US" sz="1400" dirty="0" smtClean="0"/>
-              <a:t>just working on the “Total Hours” function using a PHP script on the Volunteer Hours Report page and cleaning up the rest of the pages for our final presentation.</a:t>
+              <a:t>. </a:t>
             </a:r>
             <a:endParaRPr lang="en-US" sz="1400" dirty="0"/>
           </a:p>

</xml_diff>

<commit_message>
Project Update slides for 28Mar18
Added slide of Alternate Solution App with web link
</commit_message>
<xml_diff>
--- a/SGW Project Update 28Mar18.pptx
+++ b/SGW Project Update 28Mar18.pptx
@@ -13,14 +13,14 @@
     <p:sldId id="258" r:id="rId4"/>
     <p:sldId id="372" r:id="rId5"/>
     <p:sldId id="373" r:id="rId6"/>
-    <p:sldId id="289" r:id="rId7"/>
-    <p:sldId id="264" r:id="rId8"/>
-    <p:sldId id="266" r:id="rId9"/>
-    <p:sldId id="371" r:id="rId10"/>
-    <p:sldId id="316" r:id="rId11"/>
-    <p:sldId id="370" r:id="rId12"/>
-    <p:sldId id="310" r:id="rId13"/>
-    <p:sldId id="328" r:id="rId14"/>
+    <p:sldId id="328" r:id="rId7"/>
+    <p:sldId id="289" r:id="rId8"/>
+    <p:sldId id="264" r:id="rId9"/>
+    <p:sldId id="266" r:id="rId10"/>
+    <p:sldId id="371" r:id="rId11"/>
+    <p:sldId id="316" r:id="rId12"/>
+    <p:sldId id="370" r:id="rId13"/>
+    <p:sldId id="310" r:id="rId14"/>
   </p:sldIdLst>
   <p:sldSz cx="9144000" cy="6858000" type="screen4x3"/>
   <p:notesSz cx="6954838" cy="9240838"/>
@@ -630,7 +630,7 @@
     </p:spTree>
     <p:extLst>
       <p:ext uri="{BB962C8B-B14F-4D97-AF65-F5344CB8AC3E}">
-        <p14:creationId xmlns:p14="http://schemas.microsoft.com/office/powerpoint/2010/main" val="3748531235"/>
+        <p14:creationId xmlns:p14="http://schemas.microsoft.com/office/powerpoint/2010/main" val="1363923469"/>
       </p:ext>
     </p:extLst>
   </p:cSld>
@@ -714,7 +714,7 @@
     </p:spTree>
     <p:extLst>
       <p:ext uri="{BB962C8B-B14F-4D97-AF65-F5344CB8AC3E}">
-        <p14:creationId xmlns:p14="http://schemas.microsoft.com/office/powerpoint/2010/main" val="435529184"/>
+        <p14:creationId xmlns:p14="http://schemas.microsoft.com/office/powerpoint/2010/main" val="3748531235"/>
       </p:ext>
     </p:extLst>
   </p:cSld>
@@ -768,65 +768,7 @@
           <a:bodyPr/>
           <a:lstStyle/>
           <a:p>
-            <a:pPr marL="182880" indent="-182880">
-              <a:buFont typeface="Calibri" panose="020F0502020204030204" pitchFamily="34" charset="0"/>
-              <a:buChar char="―"/>
-            </a:pPr>
-            <a:r>
-              <a:rPr lang="en-US" sz="1400" dirty="0" smtClean="0"/>
-              <a:t>Our team has been working on meeting the user requirements for mobile capability of the site and app.</a:t>
-            </a:r>
-          </a:p>
-          <a:p>
-            <a:pPr marL="182880" indent="-182880">
-              <a:buFont typeface="Calibri" panose="020F0502020204030204" pitchFamily="34" charset="0"/>
-              <a:buChar char="―"/>
-            </a:pPr>
-            <a:r>
-              <a:rPr lang="en-US" sz="1400" baseline="0" dirty="0" smtClean="0"/>
-              <a:t>Since the client had chosen for our team to rebuild the existing app as stand-alone, we’ve made the following improvements to it:</a:t>
-            </a:r>
-          </a:p>
-          <a:p>
-            <a:pPr marL="640080" lvl="1" indent="-182880">
-              <a:buFont typeface="Calibri" panose="020F0502020204030204" pitchFamily="34" charset="0"/>
-              <a:buChar char="―"/>
-            </a:pPr>
-            <a:r>
-              <a:rPr lang="en-US" sz="1400" baseline="0" dirty="0" smtClean="0"/>
-              <a:t>We added the Login Name in each page of the app</a:t>
-            </a:r>
-          </a:p>
-          <a:p>
-            <a:pPr marL="640080" lvl="1" indent="-182880">
-              <a:buFont typeface="Calibri" panose="020F0502020204030204" pitchFamily="34" charset="0"/>
-              <a:buChar char="―"/>
-            </a:pPr>
-            <a:r>
-              <a:rPr lang="en-US" sz="1400" baseline="0" dirty="0" smtClean="0"/>
-              <a:t>We created another field that identifies volunteer hours for Hardman Farm</a:t>
-            </a:r>
-          </a:p>
-          <a:p>
-            <a:pPr marL="640080" lvl="1" indent="-182880">
-              <a:buFont typeface="Calibri" panose="020F0502020204030204" pitchFamily="34" charset="0"/>
-              <a:buChar char="―"/>
-            </a:pPr>
-            <a:r>
-              <a:rPr lang="en-US" sz="1400" baseline="0" dirty="0" smtClean="0"/>
-              <a:t>We also updated the app to run on PHP7.X and future PHP updates by resolving the obsolete MySQL functions on these later versions of PHP.</a:t>
-            </a:r>
-          </a:p>
-          <a:p>
-            <a:pPr marL="640080" lvl="1" indent="-182880">
-              <a:buFont typeface="Calibri" panose="020F0502020204030204" pitchFamily="34" charset="0"/>
-              <a:buChar char="―"/>
-            </a:pPr>
-            <a:r>
-              <a:rPr lang="en-US" sz="1400" baseline="0" dirty="0" smtClean="0"/>
-              <a:t>And we needed to move the menu from the top bar to the left sidebar to make it mobile-friendly.  The top menu bar did not work well with mobile devices.</a:t>
-            </a:r>
-            <a:endParaRPr lang="en-US" sz="1400" dirty="0"/>
+            <a:endParaRPr lang="en-US" dirty="0"/>
           </a:p>
         </p:txBody>
       </p:sp>
@@ -856,7 +798,7 @@
     </p:spTree>
     <p:extLst>
       <p:ext uri="{BB962C8B-B14F-4D97-AF65-F5344CB8AC3E}">
-        <p14:creationId xmlns:p14="http://schemas.microsoft.com/office/powerpoint/2010/main" val="1959515886"/>
+        <p14:creationId xmlns:p14="http://schemas.microsoft.com/office/powerpoint/2010/main" val="435529184"/>
       </p:ext>
     </p:extLst>
   </p:cSld>
@@ -910,13 +852,63 @@
           <a:bodyPr/>
           <a:lstStyle/>
           <a:p>
+            <a:pPr marL="182880" indent="-182880">
+              <a:buFont typeface="Calibri" panose="020F0502020204030204" pitchFamily="34" charset="0"/>
+              <a:buChar char="―"/>
+            </a:pPr>
             <a:r>
               <a:rPr lang="en-US" sz="1400" dirty="0" smtClean="0"/>
-              <a:t>This solution is pretty much done as it is able to support the Create, Read, Update, and Delete functions with each registered user of the app.  We’re just working on the “Total Hours” function using a PHP script on the Volunteer Hours Report page and cleaning up the rest of the pages for our final presentation</a:t>
-            </a:r>
-            <a:r>
-              <a:rPr lang="en-US" sz="1400" dirty="0" smtClean="0"/>
-              <a:t>. </a:t>
+              <a:t>Our team has been working on meeting the user requirements for mobile capability of the site and app.</a:t>
+            </a:r>
+          </a:p>
+          <a:p>
+            <a:pPr marL="182880" indent="-182880">
+              <a:buFont typeface="Calibri" panose="020F0502020204030204" pitchFamily="34" charset="0"/>
+              <a:buChar char="―"/>
+            </a:pPr>
+            <a:r>
+              <a:rPr lang="en-US" sz="1400" baseline="0" dirty="0" smtClean="0"/>
+              <a:t>Since the client had chosen for our team to rebuild the existing app as stand-alone, we’ve made the following improvements to it:</a:t>
+            </a:r>
+          </a:p>
+          <a:p>
+            <a:pPr marL="640080" lvl="1" indent="-182880">
+              <a:buFont typeface="Calibri" panose="020F0502020204030204" pitchFamily="34" charset="0"/>
+              <a:buChar char="―"/>
+            </a:pPr>
+            <a:r>
+              <a:rPr lang="en-US" sz="1400" baseline="0" dirty="0" smtClean="0"/>
+              <a:t>We added the Login Name in each page of the app</a:t>
+            </a:r>
+          </a:p>
+          <a:p>
+            <a:pPr marL="640080" lvl="1" indent="-182880">
+              <a:buFont typeface="Calibri" panose="020F0502020204030204" pitchFamily="34" charset="0"/>
+              <a:buChar char="―"/>
+            </a:pPr>
+            <a:r>
+              <a:rPr lang="en-US" sz="1400" baseline="0" dirty="0" smtClean="0"/>
+              <a:t>We created another field that identifies volunteer hours for Hardman Farm</a:t>
+            </a:r>
+          </a:p>
+          <a:p>
+            <a:pPr marL="640080" lvl="1" indent="-182880">
+              <a:buFont typeface="Calibri" panose="020F0502020204030204" pitchFamily="34" charset="0"/>
+              <a:buChar char="―"/>
+            </a:pPr>
+            <a:r>
+              <a:rPr lang="en-US" sz="1400" baseline="0" dirty="0" smtClean="0"/>
+              <a:t>We also updated the app to run on PHP7.X and future PHP updates by resolving the obsolete MySQL functions on these later versions of PHP.</a:t>
+            </a:r>
+          </a:p>
+          <a:p>
+            <a:pPr marL="640080" lvl="1" indent="-182880">
+              <a:buFont typeface="Calibri" panose="020F0502020204030204" pitchFamily="34" charset="0"/>
+              <a:buChar char="―"/>
+            </a:pPr>
+            <a:r>
+              <a:rPr lang="en-US" sz="1400" baseline="0" dirty="0" smtClean="0"/>
+              <a:t>And we needed to move the menu from the top bar to the left sidebar to make it mobile-friendly.  The top menu bar did not work well with mobile devices.</a:t>
             </a:r>
             <a:endParaRPr lang="en-US" sz="1400" dirty="0"/>
           </a:p>
@@ -1373,15 +1365,11 @@
           <a:bodyPr/>
           <a:lstStyle/>
           <a:p>
-            <a:pPr marL="171450" indent="-171450">
-              <a:buFont typeface="Calibri" panose="020F0502020204030204" pitchFamily="34" charset="0"/>
-              <a:buChar char="―"/>
-            </a:pPr>
-            <a:r>
-              <a:rPr lang="en-US" dirty="0" smtClean="0"/>
-              <a:t>xx</a:t>
-            </a:r>
-            <a:endParaRPr lang="en-US" dirty="0"/>
+            <a:r>
+              <a:rPr lang="en-US" sz="1400" dirty="0" smtClean="0"/>
+              <a:t>This solution is pretty much done as it is able to support the Create, Read, Update, and Delete functions with each registered user of the app.  We’re just working on the “Total Hours” function using a PHP script on the Volunteer Hours Report page and cleaning up the rest of the pages for our final presentation. </a:t>
+            </a:r>
+            <a:endParaRPr lang="en-US" sz="1400" dirty="0"/>
           </a:p>
         </p:txBody>
       </p:sp>
@@ -1411,7 +1399,7 @@
     </p:spTree>
     <p:extLst>
       <p:ext uri="{BB962C8B-B14F-4D97-AF65-F5344CB8AC3E}">
-        <p14:creationId xmlns:p14="http://schemas.microsoft.com/office/powerpoint/2010/main" val="3023141511"/>
+        <p14:creationId xmlns:p14="http://schemas.microsoft.com/office/powerpoint/2010/main" val="1959515886"/>
       </p:ext>
     </p:extLst>
   </p:cSld>
@@ -1465,26 +1453,13 @@
           <a:bodyPr/>
           <a:lstStyle/>
           <a:p>
-            <a:pPr marL="171450" marR="0" lvl="0" indent="-171450" algn="l" defTabSz="914400" rtl="0" eaLnBrk="1" fontAlgn="auto" latinLnBrk="0" hangingPunct="1">
-              <a:lnSpc>
-                <a:spcPct val="100000"/>
-              </a:lnSpc>
-              <a:spcBef>
-                <a:spcPts val="0"/>
-              </a:spcBef>
-              <a:spcAft>
-                <a:spcPts val="0"/>
-              </a:spcAft>
-              <a:buClrTx/>
-              <a:buSzTx/>
+            <a:pPr marL="171450" indent="-171450">
               <a:buFont typeface="Calibri" panose="020F0502020204030204" pitchFamily="34" charset="0"/>
               <a:buChar char="―"/>
-              <a:tabLst/>
-              <a:defRPr/>
             </a:pPr>
             <a:r>
               <a:rPr lang="en-US" dirty="0" smtClean="0"/>
-              <a:t>Briefly talk about the documentation and video tutorials that our team is already in the process of developing</a:t>
+              <a:t>xx</a:t>
             </a:r>
             <a:endParaRPr lang="en-US" dirty="0"/>
           </a:p>
@@ -1516,7 +1491,7 @@
     </p:spTree>
     <p:extLst>
       <p:ext uri="{BB962C8B-B14F-4D97-AF65-F5344CB8AC3E}">
-        <p14:creationId xmlns:p14="http://schemas.microsoft.com/office/powerpoint/2010/main" val="350034120"/>
+        <p14:creationId xmlns:p14="http://schemas.microsoft.com/office/powerpoint/2010/main" val="3023141511"/>
       </p:ext>
     </p:extLst>
   </p:cSld>
@@ -1570,6 +1545,27 @@
           <a:bodyPr/>
           <a:lstStyle/>
           <a:p>
+            <a:pPr marL="171450" marR="0" lvl="0" indent="-171450" algn="l" defTabSz="914400" rtl="0" eaLnBrk="1" fontAlgn="auto" latinLnBrk="0" hangingPunct="1">
+              <a:lnSpc>
+                <a:spcPct val="100000"/>
+              </a:lnSpc>
+              <a:spcBef>
+                <a:spcPts val="0"/>
+              </a:spcBef>
+              <a:spcAft>
+                <a:spcPts val="0"/>
+              </a:spcAft>
+              <a:buClrTx/>
+              <a:buSzTx/>
+              <a:buFont typeface="Calibri" panose="020F0502020204030204" pitchFamily="34" charset="0"/>
+              <a:buChar char="―"/>
+              <a:tabLst/>
+              <a:defRPr/>
+            </a:pPr>
+            <a:r>
+              <a:rPr lang="en-US" dirty="0" smtClean="0"/>
+              <a:t>Briefly talk about the documentation and video tutorials that our team is already in the process of developing</a:t>
+            </a:r>
             <a:endParaRPr lang="en-US" dirty="0"/>
           </a:p>
         </p:txBody>
@@ -1600,7 +1596,7 @@
     </p:spTree>
     <p:extLst>
       <p:ext uri="{BB962C8B-B14F-4D97-AF65-F5344CB8AC3E}">
-        <p14:creationId xmlns:p14="http://schemas.microsoft.com/office/powerpoint/2010/main" val="1363923469"/>
+        <p14:creationId xmlns:p14="http://schemas.microsoft.com/office/powerpoint/2010/main" val="350034120"/>
       </p:ext>
     </p:extLst>
   </p:cSld>
@@ -5527,6 +5523,73 @@
         </p:nvSpPr>
         <p:spPr>
           <a:xfrm>
+            <a:off x="457200" y="2286000"/>
+            <a:ext cx="8229600" cy="1143000"/>
+          </a:xfrm>
+        </p:spPr>
+        <p:txBody>
+          <a:bodyPr>
+            <a:normAutofit/>
+          </a:bodyPr>
+          <a:lstStyle/>
+          <a:p>
+            <a:r>
+              <a:rPr lang="en-US" sz="5400" b="1" dirty="0" smtClean="0"/>
+              <a:t>BACKUPS</a:t>
+            </a:r>
+            <a:endParaRPr lang="en-US" sz="5400" b="1" dirty="0"/>
+          </a:p>
+        </p:txBody>
+      </p:sp>
+    </p:spTree>
+    <p:extLst>
+      <p:ext uri="{BB962C8B-B14F-4D97-AF65-F5344CB8AC3E}">
+        <p14:creationId xmlns:p14="http://schemas.microsoft.com/office/powerpoint/2010/main" val="648221376"/>
+      </p:ext>
+    </p:extLst>
+  </p:cSld>
+  <p:clrMapOvr>
+    <a:masterClrMapping/>
+  </p:clrMapOvr>
+  <p:timing>
+    <p:tnLst>
+      <p:par>
+        <p:cTn id="1" dur="indefinite" restart="never" nodeType="tmRoot"/>
+      </p:par>
+    </p:tnLst>
+  </p:timing>
+</p:sld>
+</file>
+
+<file path=ppt/slides/slide11.xml><?xml version="1.0" encoding="utf-8"?>
+<p:sld xmlns:a="http://schemas.openxmlformats.org/drawingml/2006/main" xmlns:r="http://schemas.openxmlformats.org/officeDocument/2006/relationships" xmlns:p="http://schemas.openxmlformats.org/presentationml/2006/main">
+  <p:cSld>
+    <p:spTree>
+      <p:nvGrpSpPr>
+        <p:cNvPr id="1" name=""/>
+        <p:cNvGrpSpPr/>
+        <p:nvPr/>
+      </p:nvGrpSpPr>
+      <p:grpSpPr>
+        <a:xfrm>
+          <a:off x="0" y="0"/>
+          <a:ext cx="0" cy="0"/>
+          <a:chOff x="0" y="0"/>
+          <a:chExt cx="0" cy="0"/>
+        </a:xfrm>
+      </p:grpSpPr>
+      <p:sp>
+        <p:nvSpPr>
+          <p:cNvPr id="2" name="Title 1"/>
+          <p:cNvSpPr>
+            <a:spLocks noGrp="1"/>
+          </p:cNvSpPr>
+          <p:nvPr>
+            <p:ph type="title"/>
+          </p:nvPr>
+        </p:nvSpPr>
+        <p:spPr>
+          <a:xfrm>
             <a:off x="457200" y="152400"/>
             <a:ext cx="3362756" cy="1143000"/>
           </a:xfrm>
@@ -5674,7 +5737,7 @@
 </p:sld>
 </file>
 
-<file path=ppt/slides/slide11.xml><?xml version="1.0" encoding="utf-8"?>
+<file path=ppt/slides/slide12.xml><?xml version="1.0" encoding="utf-8"?>
 <p:sld xmlns:a="http://schemas.openxmlformats.org/drawingml/2006/main" xmlns:r="http://schemas.openxmlformats.org/officeDocument/2006/relationships" xmlns:p="http://schemas.openxmlformats.org/presentationml/2006/main">
   <p:cSld>
     <p:spTree>
@@ -5876,7 +5939,7 @@
 </p:sld>
 </file>
 
-<file path=ppt/slides/slide12.xml><?xml version="1.0" encoding="utf-8"?>
+<file path=ppt/slides/slide13.xml><?xml version="1.0" encoding="utf-8"?>
 <p:sld xmlns:a="http://schemas.openxmlformats.org/drawingml/2006/main" xmlns:r="http://schemas.openxmlformats.org/officeDocument/2006/relationships" xmlns:p="http://schemas.openxmlformats.org/presentationml/2006/main">
   <p:cSld>
     <p:spTree>
@@ -6151,255 +6214,6 @@
 </p:sld>
 </file>
 
-<file path=ppt/slides/slide13.xml><?xml version="1.0" encoding="utf-8"?>
-<p:sld xmlns:a="http://schemas.openxmlformats.org/drawingml/2006/main" xmlns:r="http://schemas.openxmlformats.org/officeDocument/2006/relationships" xmlns:p="http://schemas.openxmlformats.org/presentationml/2006/main">
-  <p:cSld>
-    <p:spTree>
-      <p:nvGrpSpPr>
-        <p:cNvPr id="1" name=""/>
-        <p:cNvGrpSpPr/>
-        <p:nvPr/>
-      </p:nvGrpSpPr>
-      <p:grpSpPr>
-        <a:xfrm>
-          <a:off x="0" y="0"/>
-          <a:ext cx="0" cy="0"/>
-          <a:chOff x="0" y="0"/>
-          <a:chExt cx="0" cy="0"/>
-        </a:xfrm>
-      </p:grpSpPr>
-      <p:sp>
-        <p:nvSpPr>
-          <p:cNvPr id="2" name="Title 1"/>
-          <p:cNvSpPr>
-            <a:spLocks noGrp="1"/>
-          </p:cNvSpPr>
-          <p:nvPr>
-            <p:ph type="title"/>
-          </p:nvPr>
-        </p:nvSpPr>
-        <p:spPr>
-          <a:xfrm>
-            <a:off x="457200" y="76200"/>
-            <a:ext cx="7772400" cy="990600"/>
-          </a:xfrm>
-        </p:spPr>
-        <p:txBody>
-          <a:bodyPr/>
-          <a:lstStyle/>
-          <a:p>
-            <a:pPr algn="l"/>
-            <a:r>
-              <a:rPr lang="en-US" b="1" dirty="0"/>
-              <a:t>Volunteer App in WordPress</a:t>
-            </a:r>
-          </a:p>
-        </p:txBody>
-      </p:sp>
-      <p:sp>
-        <p:nvSpPr>
-          <p:cNvPr id="3" name="Content Placeholder 2"/>
-          <p:cNvSpPr>
-            <a:spLocks noGrp="1"/>
-          </p:cNvSpPr>
-          <p:nvPr>
-            <p:ph idx="1"/>
-          </p:nvPr>
-        </p:nvSpPr>
-        <p:spPr>
-          <a:xfrm>
-            <a:off x="533400" y="838200"/>
-            <a:ext cx="8153400" cy="4724400"/>
-          </a:xfrm>
-        </p:spPr>
-        <p:txBody>
-          <a:bodyPr>
-            <a:normAutofit/>
-          </a:bodyPr>
-          <a:lstStyle/>
-          <a:p>
-            <a:pPr>
-              <a:spcBef>
-                <a:spcPts val="0"/>
-              </a:spcBef>
-              <a:spcAft>
-                <a:spcPts val="600"/>
-              </a:spcAft>
-            </a:pPr>
-            <a:r>
-              <a:rPr lang="en-US" sz="3000" dirty="0" smtClean="0"/>
-              <a:t>Alternate Solution using free plugins</a:t>
-            </a:r>
-          </a:p>
-        </p:txBody>
-      </p:sp>
-      <p:pic>
-        <p:nvPicPr>
-          <p:cNvPr id="5" name="Picture 3"/>
-          <p:cNvPicPr>
-            <a:picLocks noChangeAspect="1" noChangeArrowheads="1"/>
-          </p:cNvPicPr>
-          <p:nvPr/>
-        </p:nvPicPr>
-        <p:blipFill>
-          <a:blip r:embed="rId3" cstate="print">
-            <a:extLst>
-              <a:ext uri="{28A0092B-C50C-407E-A947-70E740481C1C}">
-                <a14:useLocalDpi xmlns:a14="http://schemas.microsoft.com/office/drawing/2010/main" val="0"/>
-              </a:ext>
-            </a:extLst>
-          </a:blip>
-          <a:srcRect/>
-          <a:stretch>
-            <a:fillRect/>
-          </a:stretch>
-        </p:blipFill>
-        <p:spPr bwMode="auto">
-          <a:xfrm>
-            <a:off x="4948" y="3787818"/>
-            <a:ext cx="5206553" cy="3046431"/>
-          </a:xfrm>
-          <a:prstGeom prst="rect">
-            <a:avLst/>
-          </a:prstGeom>
-          <a:noFill/>
-          <a:ln w="9525">
-            <a:solidFill>
-              <a:schemeClr val="tx1"/>
-            </a:solidFill>
-            <a:miter lim="800000"/>
-            <a:headEnd/>
-            <a:tailEnd/>
-          </a:ln>
-          <a:extLst>
-            <a:ext uri="{909E8E84-426E-40DD-AFC4-6F175D3DCCD1}">
-              <a14:hiddenFill xmlns:a14="http://schemas.microsoft.com/office/drawing/2010/main">
-                <a:solidFill>
-                  <a:schemeClr val="accent1"/>
-                </a:solidFill>
-              </a14:hiddenFill>
-            </a:ext>
-          </a:extLst>
-        </p:spPr>
-      </p:pic>
-      <p:pic>
-        <p:nvPicPr>
-          <p:cNvPr id="6" name="Picture 2"/>
-          <p:cNvPicPr>
-            <a:picLocks noChangeAspect="1" noChangeArrowheads="1"/>
-          </p:cNvPicPr>
-          <p:nvPr/>
-        </p:nvPicPr>
-        <p:blipFill>
-          <a:blip r:embed="rId4" cstate="print">
-            <a:extLst>
-              <a:ext uri="{28A0092B-C50C-407E-A947-70E740481C1C}">
-                <a14:useLocalDpi xmlns:a14="http://schemas.microsoft.com/office/drawing/2010/main" val="0"/>
-              </a:ext>
-            </a:extLst>
-          </a:blip>
-          <a:srcRect/>
-          <a:stretch>
-            <a:fillRect/>
-          </a:stretch>
-        </p:blipFill>
-        <p:spPr bwMode="auto">
-          <a:xfrm>
-            <a:off x="3700107" y="3506769"/>
-            <a:ext cx="5443894" cy="3046431"/>
-          </a:xfrm>
-          <a:prstGeom prst="rect">
-            <a:avLst/>
-          </a:prstGeom>
-          <a:noFill/>
-          <a:ln w="9525">
-            <a:solidFill>
-              <a:schemeClr val="tx1"/>
-            </a:solidFill>
-            <a:miter lim="800000"/>
-            <a:headEnd/>
-            <a:tailEnd/>
-          </a:ln>
-          <a:extLst>
-            <a:ext uri="{909E8E84-426E-40DD-AFC4-6F175D3DCCD1}">
-              <a14:hiddenFill xmlns:a14="http://schemas.microsoft.com/office/drawing/2010/main">
-                <a:solidFill>
-                  <a:schemeClr val="accent1"/>
-                </a:solidFill>
-              </a14:hiddenFill>
-            </a:ext>
-          </a:extLst>
-        </p:spPr>
-      </p:pic>
-      <p:pic>
-        <p:nvPicPr>
-          <p:cNvPr id="5122" name="Picture 2"/>
-          <p:cNvPicPr>
-            <a:picLocks noChangeAspect="1" noChangeArrowheads="1"/>
-          </p:cNvPicPr>
-          <p:nvPr/>
-        </p:nvPicPr>
-        <p:blipFill>
-          <a:blip r:embed="rId5" cstate="print">
-            <a:extLst>
-              <a:ext uri="{28A0092B-C50C-407E-A947-70E740481C1C}">
-                <a14:useLocalDpi xmlns:a14="http://schemas.microsoft.com/office/drawing/2010/main" val="0"/>
-              </a:ext>
-            </a:extLst>
-          </a:blip>
-          <a:srcRect/>
-          <a:stretch>
-            <a:fillRect/>
-          </a:stretch>
-        </p:blipFill>
-        <p:spPr bwMode="auto">
-          <a:xfrm>
-            <a:off x="2608224" y="1371600"/>
-            <a:ext cx="3868776" cy="2275574"/>
-          </a:xfrm>
-          <a:prstGeom prst="rect">
-            <a:avLst/>
-          </a:prstGeom>
-          <a:noFill/>
-          <a:ln w="9525">
-            <a:solidFill>
-              <a:schemeClr val="tx1"/>
-            </a:solidFill>
-            <a:miter lim="800000"/>
-            <a:headEnd/>
-            <a:tailEnd/>
-          </a:ln>
-          <a:extLst>
-            <a:ext uri="{909E8E84-426E-40DD-AFC4-6F175D3DCCD1}">
-              <a14:hiddenFill xmlns:a14="http://schemas.microsoft.com/office/drawing/2010/main">
-                <a:solidFill>
-                  <a:schemeClr val="accent1"/>
-                </a:solidFill>
-              </a14:hiddenFill>
-            </a:ext>
-          </a:extLst>
-        </p:spPr>
-      </p:pic>
-    </p:spTree>
-    <p:extLst>
-      <p:ext uri="{BB962C8B-B14F-4D97-AF65-F5344CB8AC3E}">
-        <p14:creationId xmlns:p14="http://schemas.microsoft.com/office/powerpoint/2010/main" val="4007409234"/>
-      </p:ext>
-    </p:extLst>
-  </p:cSld>
-  <p:clrMapOvr>
-    <a:masterClrMapping/>
-  </p:clrMapOvr>
-  <p:timing>
-    <p:tnLst>
-      <p:par>
-        <p:cTn id="1" dur="indefinite" restart="never" nodeType="tmRoot"/>
-      </p:par>
-    </p:tnLst>
-  </p:timing>
-</p:sld>
-</file>
-
 <file path=ppt/slides/slide2.xml><?xml version="1.0" encoding="utf-8"?>
 <p:sld xmlns:a="http://schemas.openxmlformats.org/drawingml/2006/main" xmlns:r="http://schemas.openxmlformats.org/officeDocument/2006/relationships" xmlns:p="http://schemas.openxmlformats.org/presentationml/2006/main">
   <p:cSld>
@@ -7310,6 +7124,284 @@
         <p:spPr>
           <a:xfrm>
             <a:off x="457200" y="76200"/>
+            <a:ext cx="7772400" cy="990600"/>
+          </a:xfrm>
+        </p:spPr>
+        <p:txBody>
+          <a:bodyPr/>
+          <a:lstStyle/>
+          <a:p>
+            <a:pPr algn="l"/>
+            <a:r>
+              <a:rPr lang="en-US" b="1" dirty="0"/>
+              <a:t>Volunteer App in WordPress</a:t>
+            </a:r>
+          </a:p>
+        </p:txBody>
+      </p:sp>
+      <p:sp>
+        <p:nvSpPr>
+          <p:cNvPr id="3" name="Content Placeholder 2"/>
+          <p:cNvSpPr>
+            <a:spLocks noGrp="1"/>
+          </p:cNvSpPr>
+          <p:nvPr>
+            <p:ph idx="1"/>
+          </p:nvPr>
+        </p:nvSpPr>
+        <p:spPr>
+          <a:xfrm>
+            <a:off x="457200" y="914400"/>
+            <a:ext cx="8153400" cy="4724400"/>
+          </a:xfrm>
+        </p:spPr>
+        <p:txBody>
+          <a:bodyPr>
+            <a:normAutofit/>
+          </a:bodyPr>
+          <a:lstStyle/>
+          <a:p>
+            <a:pPr>
+              <a:spcBef>
+                <a:spcPts val="0"/>
+              </a:spcBef>
+              <a:spcAft>
+                <a:spcPts val="600"/>
+              </a:spcAft>
+            </a:pPr>
+            <a:r>
+              <a:rPr lang="en-US" sz="3000" dirty="0" smtClean="0"/>
+              <a:t>Alternate Solution using free </a:t>
+            </a:r>
+            <a:r>
+              <a:rPr lang="en-US" sz="3000" dirty="0" smtClean="0"/>
+              <a:t>plugins</a:t>
+            </a:r>
+          </a:p>
+          <a:p>
+            <a:pPr lvl="1">
+              <a:spcBef>
+                <a:spcPts val="0"/>
+              </a:spcBef>
+              <a:spcAft>
+                <a:spcPts val="600"/>
+              </a:spcAft>
+            </a:pPr>
+            <a:r>
+              <a:rPr lang="en-US" sz="2600" dirty="0" smtClean="0"/>
+              <a:t>Demo Site: </a:t>
+            </a:r>
+            <a:r>
+              <a:rPr lang="en-US" sz="2200" dirty="0" smtClean="0">
+                <a:hlinkClick r:id="rId3"/>
+              </a:rPr>
+              <a:t>www.friendsofsmithgallwoods.org/test/eliseo/</a:t>
+            </a:r>
+            <a:r>
+              <a:rPr lang="en-US" sz="2200" dirty="0" smtClean="0"/>
+              <a:t> </a:t>
+            </a:r>
+            <a:endParaRPr lang="en-US" sz="2200" dirty="0" smtClean="0"/>
+          </a:p>
+        </p:txBody>
+      </p:sp>
+      <p:pic>
+        <p:nvPicPr>
+          <p:cNvPr id="5" name="Picture 3"/>
+          <p:cNvPicPr>
+            <a:picLocks noChangeAspect="1" noChangeArrowheads="1"/>
+          </p:cNvPicPr>
+          <p:nvPr/>
+        </p:nvPicPr>
+        <p:blipFill>
+          <a:blip r:embed="rId4" cstate="print">
+            <a:extLst>
+              <a:ext uri="{28A0092B-C50C-407E-A947-70E740481C1C}">
+                <a14:useLocalDpi xmlns:a14="http://schemas.microsoft.com/office/drawing/2010/main" val="0"/>
+              </a:ext>
+            </a:extLst>
+          </a:blip>
+          <a:srcRect/>
+          <a:stretch>
+            <a:fillRect/>
+          </a:stretch>
+        </p:blipFill>
+        <p:spPr bwMode="auto">
+          <a:xfrm>
+            <a:off x="4948" y="3787818"/>
+            <a:ext cx="5206553" cy="3046431"/>
+          </a:xfrm>
+          <a:prstGeom prst="rect">
+            <a:avLst/>
+          </a:prstGeom>
+          <a:noFill/>
+          <a:ln w="9525">
+            <a:solidFill>
+              <a:schemeClr val="tx1"/>
+            </a:solidFill>
+            <a:miter lim="800000"/>
+            <a:headEnd/>
+            <a:tailEnd/>
+          </a:ln>
+          <a:extLst>
+            <a:ext uri="{909E8E84-426E-40DD-AFC4-6F175D3DCCD1}">
+              <a14:hiddenFill xmlns:a14="http://schemas.microsoft.com/office/drawing/2010/main">
+                <a:solidFill>
+                  <a:schemeClr val="accent1"/>
+                </a:solidFill>
+              </a14:hiddenFill>
+            </a:ext>
+          </a:extLst>
+        </p:spPr>
+      </p:pic>
+      <p:pic>
+        <p:nvPicPr>
+          <p:cNvPr id="6" name="Picture 2"/>
+          <p:cNvPicPr>
+            <a:picLocks noChangeAspect="1" noChangeArrowheads="1"/>
+          </p:cNvPicPr>
+          <p:nvPr/>
+        </p:nvPicPr>
+        <p:blipFill>
+          <a:blip r:embed="rId5" cstate="print">
+            <a:extLst>
+              <a:ext uri="{28A0092B-C50C-407E-A947-70E740481C1C}">
+                <a14:useLocalDpi xmlns:a14="http://schemas.microsoft.com/office/drawing/2010/main" val="0"/>
+              </a:ext>
+            </a:extLst>
+          </a:blip>
+          <a:srcRect/>
+          <a:stretch>
+            <a:fillRect/>
+          </a:stretch>
+        </p:blipFill>
+        <p:spPr bwMode="auto">
+          <a:xfrm>
+            <a:off x="3700107" y="3430569"/>
+            <a:ext cx="5443894" cy="3046431"/>
+          </a:xfrm>
+          <a:prstGeom prst="rect">
+            <a:avLst/>
+          </a:prstGeom>
+          <a:noFill/>
+          <a:ln w="9525">
+            <a:solidFill>
+              <a:schemeClr val="tx1"/>
+            </a:solidFill>
+            <a:miter lim="800000"/>
+            <a:headEnd/>
+            <a:tailEnd/>
+          </a:ln>
+          <a:extLst>
+            <a:ext uri="{909E8E84-426E-40DD-AFC4-6F175D3DCCD1}">
+              <a14:hiddenFill xmlns:a14="http://schemas.microsoft.com/office/drawing/2010/main">
+                <a:solidFill>
+                  <a:schemeClr val="accent1"/>
+                </a:solidFill>
+              </a14:hiddenFill>
+            </a:ext>
+          </a:extLst>
+        </p:spPr>
+      </p:pic>
+      <p:pic>
+        <p:nvPicPr>
+          <p:cNvPr id="5122" name="Picture 2"/>
+          <p:cNvPicPr>
+            <a:picLocks noChangeAspect="1" noChangeArrowheads="1"/>
+          </p:cNvPicPr>
+          <p:nvPr/>
+        </p:nvPicPr>
+        <p:blipFill>
+          <a:blip r:embed="rId6" cstate="print">
+            <a:extLst>
+              <a:ext uri="{28A0092B-C50C-407E-A947-70E740481C1C}">
+                <a14:useLocalDpi xmlns:a14="http://schemas.microsoft.com/office/drawing/2010/main" val="0"/>
+              </a:ext>
+            </a:extLst>
+          </a:blip>
+          <a:srcRect/>
+          <a:stretch>
+            <a:fillRect/>
+          </a:stretch>
+        </p:blipFill>
+        <p:spPr bwMode="auto">
+          <a:xfrm>
+            <a:off x="5573096" y="1962097"/>
+            <a:ext cx="3530329" cy="2076503"/>
+          </a:xfrm>
+          <a:prstGeom prst="rect">
+            <a:avLst/>
+          </a:prstGeom>
+          <a:noFill/>
+          <a:ln w="9525">
+            <a:solidFill>
+              <a:schemeClr val="tx1"/>
+            </a:solidFill>
+            <a:miter lim="800000"/>
+            <a:headEnd/>
+            <a:tailEnd/>
+          </a:ln>
+          <a:extLst>
+            <a:ext uri="{909E8E84-426E-40DD-AFC4-6F175D3DCCD1}">
+              <a14:hiddenFill xmlns:a14="http://schemas.microsoft.com/office/drawing/2010/main">
+                <a:solidFill>
+                  <a:schemeClr val="accent1"/>
+                </a:solidFill>
+              </a14:hiddenFill>
+            </a:ext>
+          </a:extLst>
+        </p:spPr>
+      </p:pic>
+    </p:spTree>
+    <p:extLst>
+      <p:ext uri="{BB962C8B-B14F-4D97-AF65-F5344CB8AC3E}">
+        <p14:creationId xmlns:p14="http://schemas.microsoft.com/office/powerpoint/2010/main" val="4007409234"/>
+      </p:ext>
+    </p:extLst>
+  </p:cSld>
+  <p:clrMapOvr>
+    <a:masterClrMapping/>
+  </p:clrMapOvr>
+  <p:timing>
+    <p:tnLst>
+      <p:par>
+        <p:cTn id="1" dur="indefinite" restart="never" nodeType="tmRoot"/>
+      </p:par>
+    </p:tnLst>
+  </p:timing>
+</p:sld>
+</file>
+
+<file path=ppt/slides/slide7.xml><?xml version="1.0" encoding="utf-8"?>
+<p:sld xmlns:a="http://schemas.openxmlformats.org/drawingml/2006/main" xmlns:r="http://schemas.openxmlformats.org/officeDocument/2006/relationships" xmlns:p="http://schemas.openxmlformats.org/presentationml/2006/main">
+  <p:cSld>
+    <p:spTree>
+      <p:nvGrpSpPr>
+        <p:cNvPr id="1" name=""/>
+        <p:cNvGrpSpPr/>
+        <p:nvPr/>
+      </p:nvGrpSpPr>
+      <p:grpSpPr>
+        <a:xfrm>
+          <a:off x="0" y="0"/>
+          <a:ext cx="0" cy="0"/>
+          <a:chOff x="0" y="0"/>
+          <a:chExt cx="0" cy="0"/>
+        </a:xfrm>
+      </p:grpSpPr>
+      <p:sp>
+        <p:nvSpPr>
+          <p:cNvPr id="2" name="Title 1"/>
+          <p:cNvSpPr>
+            <a:spLocks noGrp="1"/>
+          </p:cNvSpPr>
+          <p:nvPr>
+            <p:ph type="title"/>
+          </p:nvPr>
+        </p:nvSpPr>
+        <p:spPr>
+          <a:xfrm>
+            <a:off x="457200" y="76200"/>
             <a:ext cx="8229600" cy="1143000"/>
           </a:xfrm>
         </p:spPr>
@@ -7402,177 +7494,6 @@
 </p:sld>
 </file>
 
-<file path=ppt/slides/slide7.xml><?xml version="1.0" encoding="utf-8"?>
-<p:sld xmlns:a="http://schemas.openxmlformats.org/drawingml/2006/main" xmlns:r="http://schemas.openxmlformats.org/officeDocument/2006/relationships" xmlns:p="http://schemas.openxmlformats.org/presentationml/2006/main">
-  <p:cSld>
-    <p:spTree>
-      <p:nvGrpSpPr>
-        <p:cNvPr id="1" name=""/>
-        <p:cNvGrpSpPr/>
-        <p:nvPr/>
-      </p:nvGrpSpPr>
-      <p:grpSpPr>
-        <a:xfrm>
-          <a:off x="0" y="0"/>
-          <a:ext cx="0" cy="0"/>
-          <a:chOff x="0" y="0"/>
-          <a:chExt cx="0" cy="0"/>
-        </a:xfrm>
-      </p:grpSpPr>
-      <p:sp>
-        <p:nvSpPr>
-          <p:cNvPr id="2" name="Title 1"/>
-          <p:cNvSpPr>
-            <a:spLocks noGrp="1"/>
-          </p:cNvSpPr>
-          <p:nvPr>
-            <p:ph type="title"/>
-          </p:nvPr>
-        </p:nvSpPr>
-        <p:spPr>
-          <a:xfrm>
-            <a:off x="457200" y="76200"/>
-            <a:ext cx="8229600" cy="1143000"/>
-          </a:xfrm>
-        </p:spPr>
-        <p:txBody>
-          <a:bodyPr/>
-          <a:lstStyle/>
-          <a:p>
-            <a:pPr algn="l"/>
-            <a:r>
-              <a:rPr lang="en-US" b="1" dirty="0" smtClean="0"/>
-              <a:t>Next Tasks….</a:t>
-            </a:r>
-            <a:endParaRPr lang="en-US" b="1" dirty="0"/>
-          </a:p>
-        </p:txBody>
-      </p:sp>
-      <p:sp>
-        <p:nvSpPr>
-          <p:cNvPr id="3" name="Content Placeholder 2"/>
-          <p:cNvSpPr>
-            <a:spLocks noGrp="1"/>
-          </p:cNvSpPr>
-          <p:nvPr>
-            <p:ph idx="1"/>
-          </p:nvPr>
-        </p:nvSpPr>
-        <p:spPr>
-          <a:xfrm>
-            <a:off x="533400" y="1524000"/>
-            <a:ext cx="8382000" cy="4419600"/>
-          </a:xfrm>
-        </p:spPr>
-        <p:txBody>
-          <a:bodyPr>
-            <a:normAutofit/>
-          </a:bodyPr>
-          <a:lstStyle/>
-          <a:p>
-            <a:pPr>
-              <a:spcBef>
-                <a:spcPts val="1200"/>
-              </a:spcBef>
-            </a:pPr>
-            <a:r>
-              <a:rPr lang="en-US" dirty="0" smtClean="0"/>
-              <a:t>Finish Documentation &amp; Video Tutorials</a:t>
-            </a:r>
-          </a:p>
-          <a:p>
-            <a:pPr>
-              <a:spcBef>
-                <a:spcPts val="1200"/>
-              </a:spcBef>
-            </a:pPr>
-            <a:r>
-              <a:rPr lang="en-US" dirty="0" smtClean="0"/>
-              <a:t>Deploy Website &amp; App on ~April 4th</a:t>
-            </a:r>
-          </a:p>
-          <a:p>
-            <a:pPr>
-              <a:spcBef>
-                <a:spcPts val="1200"/>
-              </a:spcBef>
-            </a:pPr>
-            <a:r>
-              <a:rPr lang="en-US" dirty="0" smtClean="0"/>
-              <a:t>Schedule Training Session with Art</a:t>
-            </a:r>
-          </a:p>
-          <a:p>
-            <a:pPr>
-              <a:spcBef>
-                <a:spcPts val="1200"/>
-              </a:spcBef>
-            </a:pPr>
-            <a:r>
-              <a:rPr lang="en-US" dirty="0" smtClean="0"/>
-              <a:t>Set up Admin Reporting Site by Section</a:t>
-            </a:r>
-          </a:p>
-          <a:p>
-            <a:pPr lvl="1">
-              <a:spcBef>
-                <a:spcPts val="1200"/>
-              </a:spcBef>
-            </a:pPr>
-            <a:r>
-              <a:rPr lang="en-US" dirty="0" smtClean="0"/>
-              <a:t>SGW &amp; Hardman Farm</a:t>
-            </a:r>
-          </a:p>
-          <a:p>
-            <a:pPr lvl="1">
-              <a:spcBef>
-                <a:spcPts val="1200"/>
-              </a:spcBef>
-            </a:pPr>
-            <a:r>
-              <a:rPr lang="en-US" dirty="0" smtClean="0"/>
-              <a:t>PHPRunner Tool</a:t>
-            </a:r>
-          </a:p>
-          <a:p>
-            <a:pPr lvl="1">
-              <a:spcBef>
-                <a:spcPts val="1200"/>
-              </a:spcBef>
-            </a:pPr>
-            <a:endParaRPr lang="en-US" dirty="0" smtClean="0"/>
-          </a:p>
-          <a:p>
-            <a:pPr>
-              <a:spcBef>
-                <a:spcPts val="1200"/>
-              </a:spcBef>
-            </a:pPr>
-            <a:endParaRPr lang="en-US" dirty="0" smtClean="0"/>
-          </a:p>
-        </p:txBody>
-      </p:sp>
-    </p:spTree>
-    <p:extLst>
-      <p:ext uri="{BB962C8B-B14F-4D97-AF65-F5344CB8AC3E}">
-        <p14:creationId xmlns:p14="http://schemas.microsoft.com/office/powerpoint/2010/main" val="3818389730"/>
-      </p:ext>
-    </p:extLst>
-  </p:cSld>
-  <p:clrMapOvr>
-    <a:masterClrMapping/>
-  </p:clrMapOvr>
-  <p:timing>
-    <p:tnLst>
-      <p:par>
-        <p:cTn id="1" dur="indefinite" restart="never" nodeType="tmRoot"/>
-      </p:par>
-    </p:tnLst>
-  </p:timing>
-</p:sld>
-</file>
-
 <file path=ppt/slides/slide8.xml><?xml version="1.0" encoding="utf-8"?>
 <p:sld xmlns:a="http://schemas.openxmlformats.org/drawingml/2006/main" xmlns:r="http://schemas.openxmlformats.org/officeDocument/2006/relationships" xmlns:p="http://schemas.openxmlformats.org/presentationml/2006/main">
   <p:cSld>
@@ -7602,28 +7523,132 @@
         </p:nvSpPr>
         <p:spPr>
           <a:xfrm>
-            <a:off x="457200" y="2286000"/>
+            <a:off x="457200" y="76200"/>
             <a:ext cx="8229600" cy="1143000"/>
           </a:xfrm>
         </p:spPr>
         <p:txBody>
+          <a:bodyPr/>
+          <a:lstStyle/>
+          <a:p>
+            <a:pPr algn="l"/>
+            <a:r>
+              <a:rPr lang="en-US" b="1" dirty="0" smtClean="0"/>
+              <a:t>Next Tasks….</a:t>
+            </a:r>
+            <a:endParaRPr lang="en-US" b="1" dirty="0"/>
+          </a:p>
+        </p:txBody>
+      </p:sp>
+      <p:sp>
+        <p:nvSpPr>
+          <p:cNvPr id="3" name="Content Placeholder 2"/>
+          <p:cNvSpPr>
+            <a:spLocks noGrp="1"/>
+          </p:cNvSpPr>
+          <p:nvPr>
+            <p:ph idx="1"/>
+          </p:nvPr>
+        </p:nvSpPr>
+        <p:spPr>
+          <a:xfrm>
+            <a:off x="533400" y="1524000"/>
+            <a:ext cx="8382000" cy="4419600"/>
+          </a:xfrm>
+        </p:spPr>
+        <p:txBody>
           <a:bodyPr>
             <a:normAutofit/>
           </a:bodyPr>
           <a:lstStyle/>
           <a:p>
-            <a:r>
-              <a:rPr lang="en-US" sz="5400" b="1" dirty="0" smtClean="0"/>
-              <a:t>Questions</a:t>
-            </a:r>
-            <a:endParaRPr lang="en-US" sz="5400" b="1" dirty="0"/>
+            <a:pPr>
+              <a:spcBef>
+                <a:spcPts val="1200"/>
+              </a:spcBef>
+            </a:pPr>
+            <a:r>
+              <a:rPr lang="en-US" dirty="0" smtClean="0"/>
+              <a:t>Finish Documentation &amp; Video Tutorials</a:t>
+            </a:r>
+          </a:p>
+          <a:p>
+            <a:pPr>
+              <a:spcBef>
+                <a:spcPts val="1200"/>
+              </a:spcBef>
+            </a:pPr>
+            <a:r>
+              <a:rPr lang="en-US" dirty="0" smtClean="0"/>
+              <a:t>Deploy Website &amp; App on ~April 4th</a:t>
+            </a:r>
+          </a:p>
+          <a:p>
+            <a:pPr>
+              <a:spcBef>
+                <a:spcPts val="1200"/>
+              </a:spcBef>
+            </a:pPr>
+            <a:r>
+              <a:rPr lang="en-US" dirty="0" smtClean="0"/>
+              <a:t>Schedule Training Session with Art</a:t>
+            </a:r>
+          </a:p>
+          <a:p>
+            <a:pPr>
+              <a:spcBef>
+                <a:spcPts val="1200"/>
+              </a:spcBef>
+            </a:pPr>
+            <a:r>
+              <a:rPr lang="en-US" dirty="0" smtClean="0"/>
+              <a:t>Set up Admin Reporting Site by Section</a:t>
+            </a:r>
+          </a:p>
+          <a:p>
+            <a:pPr lvl="1">
+              <a:spcBef>
+                <a:spcPts val="1200"/>
+              </a:spcBef>
+            </a:pPr>
+            <a:r>
+              <a:rPr lang="en-US" dirty="0" smtClean="0"/>
+              <a:t>SGW &amp; Hardman Farm</a:t>
+            </a:r>
+          </a:p>
+          <a:p>
+            <a:pPr lvl="1">
+              <a:spcBef>
+                <a:spcPts val="1200"/>
+              </a:spcBef>
+            </a:pPr>
+            <a:r>
+              <a:rPr lang="en-US" dirty="0" smtClean="0"/>
+              <a:t>PHPRunner Tool</a:t>
+            </a:r>
+          </a:p>
+          <a:p>
+            <a:pPr lvl="1">
+              <a:spcBef>
+                <a:spcPts val="1200"/>
+              </a:spcBef>
+            </a:pPr>
+            <a:endParaRPr lang="en-US" dirty="0" smtClean="0"/>
+          </a:p>
+          <a:p>
+            <a:pPr>
+              <a:spcBef>
+                <a:spcPts val="1200"/>
+              </a:spcBef>
+            </a:pPr>
+            <a:endParaRPr lang="en-US" dirty="0" smtClean="0"/>
           </a:p>
         </p:txBody>
       </p:sp>
     </p:spTree>
     <p:extLst>
       <p:ext uri="{BB962C8B-B14F-4D97-AF65-F5344CB8AC3E}">
-        <p14:creationId xmlns:p14="http://schemas.microsoft.com/office/powerpoint/2010/main" val="2461551364"/>
+        <p14:creationId xmlns:p14="http://schemas.microsoft.com/office/powerpoint/2010/main" val="3818389730"/>
       </p:ext>
     </p:extLst>
   </p:cSld>
@@ -7681,7 +7706,7 @@
           <a:p>
             <a:r>
               <a:rPr lang="en-US" sz="5400" b="1" dirty="0" smtClean="0"/>
-              <a:t>BACKUPS</a:t>
+              <a:t>Questions</a:t>
             </a:r>
             <a:endParaRPr lang="en-US" sz="5400" b="1" dirty="0"/>
           </a:p>
@@ -7690,7 +7715,7 @@
     </p:spTree>
     <p:extLst>
       <p:ext uri="{BB962C8B-B14F-4D97-AF65-F5344CB8AC3E}">
-        <p14:creationId xmlns:p14="http://schemas.microsoft.com/office/powerpoint/2010/main" val="648221376"/>
+        <p14:creationId xmlns:p14="http://schemas.microsoft.com/office/powerpoint/2010/main" val="2461551364"/>
       </p:ext>
     </p:extLst>
   </p:cSld>

</xml_diff>

<commit_message>
Project Update slides for 28Mar
Added two slides and updated overview slide
</commit_message>
<xml_diff>
--- a/SGW Project Update 28Mar18.pptx
+++ b/SGW Project Update 28Mar18.pptx
@@ -5,22 +5,24 @@
     <p:sldMasterId id="2147483648" r:id="rId1"/>
   </p:sldMasterIdLst>
   <p:notesMasterIdLst>
-    <p:notesMasterId r:id="rId15"/>
+    <p:notesMasterId r:id="rId17"/>
   </p:notesMasterIdLst>
   <p:sldIdLst>
     <p:sldId id="256" r:id="rId2"/>
     <p:sldId id="299" r:id="rId3"/>
     <p:sldId id="258" r:id="rId4"/>
     <p:sldId id="372" r:id="rId5"/>
-    <p:sldId id="373" r:id="rId6"/>
-    <p:sldId id="328" r:id="rId7"/>
-    <p:sldId id="289" r:id="rId8"/>
-    <p:sldId id="264" r:id="rId9"/>
-    <p:sldId id="266" r:id="rId10"/>
-    <p:sldId id="371" r:id="rId11"/>
-    <p:sldId id="316" r:id="rId12"/>
-    <p:sldId id="370" r:id="rId13"/>
-    <p:sldId id="310" r:id="rId14"/>
+    <p:sldId id="375" r:id="rId6"/>
+    <p:sldId id="374" r:id="rId7"/>
+    <p:sldId id="373" r:id="rId8"/>
+    <p:sldId id="328" r:id="rId9"/>
+    <p:sldId id="289" r:id="rId10"/>
+    <p:sldId id="264" r:id="rId11"/>
+    <p:sldId id="266" r:id="rId12"/>
+    <p:sldId id="371" r:id="rId13"/>
+    <p:sldId id="316" r:id="rId14"/>
+    <p:sldId id="370" r:id="rId15"/>
+    <p:sldId id="310" r:id="rId16"/>
   </p:sldIdLst>
   <p:sldSz cx="9144000" cy="6858000" type="screen4x3"/>
   <p:notesSz cx="6954838" cy="9240838"/>
@@ -204,7 +206,7 @@
           <a:p>
             <a:fld id="{F5E77B19-4C30-44B4-BD0B-CE34772B3C65}" type="datetimeFigureOut">
               <a:rPr lang="en-US" smtClean="0"/>
-              <a:t>3/26/2018</a:t>
+              <a:t>3/27/2018</a:t>
             </a:fld>
             <a:endParaRPr lang="en-US" dirty="0"/>
           </a:p>
@@ -600,6 +602,27 @@
           <a:bodyPr/>
           <a:lstStyle/>
           <a:p>
+            <a:pPr marL="171450" marR="0" lvl="0" indent="-171450" algn="l" defTabSz="914400" rtl="0" eaLnBrk="1" fontAlgn="auto" latinLnBrk="0" hangingPunct="1">
+              <a:lnSpc>
+                <a:spcPct val="100000"/>
+              </a:lnSpc>
+              <a:spcBef>
+                <a:spcPts val="0"/>
+              </a:spcBef>
+              <a:spcAft>
+                <a:spcPts val="0"/>
+              </a:spcAft>
+              <a:buClrTx/>
+              <a:buSzTx/>
+              <a:buFont typeface="Calibri" panose="020F0502020204030204" pitchFamily="34" charset="0"/>
+              <a:buChar char="―"/>
+              <a:tabLst/>
+              <a:defRPr/>
+            </a:pPr>
+            <a:r>
+              <a:rPr lang="en-US" dirty="0" smtClean="0"/>
+              <a:t>Briefly talk about the documentation and video tutorials that our team is already in the process of developing</a:t>
+            </a:r>
             <a:endParaRPr lang="en-US" dirty="0"/>
           </a:p>
         </p:txBody>
@@ -630,7 +653,7 @@
     </p:spTree>
     <p:extLst>
       <p:ext uri="{BB962C8B-B14F-4D97-AF65-F5344CB8AC3E}">
-        <p14:creationId xmlns:p14="http://schemas.microsoft.com/office/powerpoint/2010/main" val="1363923469"/>
+        <p14:creationId xmlns:p14="http://schemas.microsoft.com/office/powerpoint/2010/main" val="350034120"/>
       </p:ext>
     </p:extLst>
   </p:cSld>
@@ -714,7 +737,7 @@
     </p:spTree>
     <p:extLst>
       <p:ext uri="{BB962C8B-B14F-4D97-AF65-F5344CB8AC3E}">
-        <p14:creationId xmlns:p14="http://schemas.microsoft.com/office/powerpoint/2010/main" val="3748531235"/>
+        <p14:creationId xmlns:p14="http://schemas.microsoft.com/office/powerpoint/2010/main" val="1363923469"/>
       </p:ext>
     </p:extLst>
   </p:cSld>
@@ -798,7 +821,7 @@
     </p:spTree>
     <p:extLst>
       <p:ext uri="{BB962C8B-B14F-4D97-AF65-F5344CB8AC3E}">
-        <p14:creationId xmlns:p14="http://schemas.microsoft.com/office/powerpoint/2010/main" val="435529184"/>
+        <p14:creationId xmlns:p14="http://schemas.microsoft.com/office/powerpoint/2010/main" val="1363923469"/>
       </p:ext>
     </p:extLst>
   </p:cSld>
@@ -852,6 +875,174 @@
           <a:bodyPr/>
           <a:lstStyle/>
           <a:p>
+            <a:endParaRPr lang="en-US" dirty="0"/>
+          </a:p>
+        </p:txBody>
+      </p:sp>
+      <p:sp>
+        <p:nvSpPr>
+          <p:cNvPr id="4" name="Slide Number Placeholder 3"/>
+          <p:cNvSpPr>
+            <a:spLocks noGrp="1"/>
+          </p:cNvSpPr>
+          <p:nvPr>
+            <p:ph type="sldNum" sz="quarter" idx="10"/>
+          </p:nvPr>
+        </p:nvSpPr>
+        <p:spPr/>
+        <p:txBody>
+          <a:bodyPr/>
+          <a:lstStyle/>
+          <a:p>
+            <a:fld id="{EC08C6C5-DD63-4A3D-AD22-7D6D36F6A3FB}" type="slidenum">
+              <a:rPr lang="en-US" smtClean="0"/>
+              <a:t>13</a:t>
+            </a:fld>
+            <a:endParaRPr lang="en-US" dirty="0"/>
+          </a:p>
+        </p:txBody>
+      </p:sp>
+    </p:spTree>
+    <p:extLst>
+      <p:ext uri="{BB962C8B-B14F-4D97-AF65-F5344CB8AC3E}">
+        <p14:creationId xmlns:p14="http://schemas.microsoft.com/office/powerpoint/2010/main" val="3748531235"/>
+      </p:ext>
+    </p:extLst>
+  </p:cSld>
+  <p:clrMapOvr>
+    <a:masterClrMapping/>
+  </p:clrMapOvr>
+</p:notes>
+</file>
+
+<file path=ppt/notesSlides/notesSlide14.xml><?xml version="1.0" encoding="utf-8"?>
+<p:notes xmlns:a="http://schemas.openxmlformats.org/drawingml/2006/main" xmlns:r="http://schemas.openxmlformats.org/officeDocument/2006/relationships" xmlns:p="http://schemas.openxmlformats.org/presentationml/2006/main">
+  <p:cSld>
+    <p:spTree>
+      <p:nvGrpSpPr>
+        <p:cNvPr id="1" name=""/>
+        <p:cNvGrpSpPr/>
+        <p:nvPr/>
+      </p:nvGrpSpPr>
+      <p:grpSpPr>
+        <a:xfrm>
+          <a:off x="0" y="0"/>
+          <a:ext cx="0" cy="0"/>
+          <a:chOff x="0" y="0"/>
+          <a:chExt cx="0" cy="0"/>
+        </a:xfrm>
+      </p:grpSpPr>
+      <p:sp>
+        <p:nvSpPr>
+          <p:cNvPr id="2" name="Slide Image Placeholder 1"/>
+          <p:cNvSpPr>
+            <a:spLocks noGrp="1" noRot="1" noChangeAspect="1"/>
+          </p:cNvSpPr>
+          <p:nvPr>
+            <p:ph type="sldImg"/>
+          </p:nvPr>
+        </p:nvSpPr>
+        <p:spPr/>
+      </p:sp>
+      <p:sp>
+        <p:nvSpPr>
+          <p:cNvPr id="3" name="Notes Placeholder 2"/>
+          <p:cNvSpPr>
+            <a:spLocks noGrp="1"/>
+          </p:cNvSpPr>
+          <p:nvPr>
+            <p:ph type="body" idx="1"/>
+          </p:nvPr>
+        </p:nvSpPr>
+        <p:spPr/>
+        <p:txBody>
+          <a:bodyPr/>
+          <a:lstStyle/>
+          <a:p>
+            <a:endParaRPr lang="en-US" dirty="0"/>
+          </a:p>
+        </p:txBody>
+      </p:sp>
+      <p:sp>
+        <p:nvSpPr>
+          <p:cNvPr id="4" name="Slide Number Placeholder 3"/>
+          <p:cNvSpPr>
+            <a:spLocks noGrp="1"/>
+          </p:cNvSpPr>
+          <p:nvPr>
+            <p:ph type="sldNum" sz="quarter" idx="10"/>
+          </p:nvPr>
+        </p:nvSpPr>
+        <p:spPr/>
+        <p:txBody>
+          <a:bodyPr/>
+          <a:lstStyle/>
+          <a:p>
+            <a:fld id="{EC08C6C5-DD63-4A3D-AD22-7D6D36F6A3FB}" type="slidenum">
+              <a:rPr lang="en-US" smtClean="0"/>
+              <a:t>14</a:t>
+            </a:fld>
+            <a:endParaRPr lang="en-US" dirty="0"/>
+          </a:p>
+        </p:txBody>
+      </p:sp>
+    </p:spTree>
+    <p:extLst>
+      <p:ext uri="{BB962C8B-B14F-4D97-AF65-F5344CB8AC3E}">
+        <p14:creationId xmlns:p14="http://schemas.microsoft.com/office/powerpoint/2010/main" val="435529184"/>
+      </p:ext>
+    </p:extLst>
+  </p:cSld>
+  <p:clrMapOvr>
+    <a:masterClrMapping/>
+  </p:clrMapOvr>
+</p:notes>
+</file>
+
+<file path=ppt/notesSlides/notesSlide15.xml><?xml version="1.0" encoding="utf-8"?>
+<p:notes xmlns:a="http://schemas.openxmlformats.org/drawingml/2006/main" xmlns:r="http://schemas.openxmlformats.org/officeDocument/2006/relationships" xmlns:p="http://schemas.openxmlformats.org/presentationml/2006/main">
+  <p:cSld>
+    <p:spTree>
+      <p:nvGrpSpPr>
+        <p:cNvPr id="1" name=""/>
+        <p:cNvGrpSpPr/>
+        <p:nvPr/>
+      </p:nvGrpSpPr>
+      <p:grpSpPr>
+        <a:xfrm>
+          <a:off x="0" y="0"/>
+          <a:ext cx="0" cy="0"/>
+          <a:chOff x="0" y="0"/>
+          <a:chExt cx="0" cy="0"/>
+        </a:xfrm>
+      </p:grpSpPr>
+      <p:sp>
+        <p:nvSpPr>
+          <p:cNvPr id="2" name="Slide Image Placeholder 1"/>
+          <p:cNvSpPr>
+            <a:spLocks noGrp="1" noRot="1" noChangeAspect="1"/>
+          </p:cNvSpPr>
+          <p:nvPr>
+            <p:ph type="sldImg"/>
+          </p:nvPr>
+        </p:nvSpPr>
+        <p:spPr/>
+      </p:sp>
+      <p:sp>
+        <p:nvSpPr>
+          <p:cNvPr id="3" name="Notes Placeholder 2"/>
+          <p:cNvSpPr>
+            <a:spLocks noGrp="1"/>
+          </p:cNvSpPr>
+          <p:nvPr>
+            <p:ph type="body" idx="1"/>
+          </p:nvPr>
+        </p:nvSpPr>
+        <p:spPr/>
+        <p:txBody>
+          <a:bodyPr/>
+          <a:lstStyle/>
+          <a:p>
             <a:pPr marL="182880" indent="-182880">
               <a:buFont typeface="Calibri" panose="020F0502020204030204" pitchFamily="34" charset="0"/>
               <a:buChar char="―"/>
@@ -931,7 +1122,7 @@
           <a:p>
             <a:fld id="{EC08C6C5-DD63-4A3D-AD22-7D6D36F6A3FB}" type="slidenum">
               <a:rPr lang="en-US" smtClean="0"/>
-              <a:t>13</a:t>
+              <a:t>15</a:t>
             </a:fld>
             <a:endParaRPr lang="en-US" dirty="0"/>
           </a:p>
@@ -1365,10 +1556,6 @@
           <a:bodyPr/>
           <a:lstStyle/>
           <a:p>
-            <a:r>
-              <a:rPr lang="en-US" sz="1400" dirty="0" smtClean="0"/>
-              <a:t>This solution is pretty much done as it is able to support the Create, Read, Update, and Delete functions with each registered user of the app.  We’re just working on the “Total Hours” function using a PHP script on the Volunteer Hours Report page and cleaning up the rest of the pages for our final presentation. </a:t>
-            </a:r>
             <a:endParaRPr lang="en-US" sz="1400" dirty="0"/>
           </a:p>
         </p:txBody>
@@ -1399,7 +1586,7 @@
     </p:spTree>
     <p:extLst>
       <p:ext uri="{BB962C8B-B14F-4D97-AF65-F5344CB8AC3E}">
-        <p14:creationId xmlns:p14="http://schemas.microsoft.com/office/powerpoint/2010/main" val="1959515886"/>
+        <p14:creationId xmlns:p14="http://schemas.microsoft.com/office/powerpoint/2010/main" val="2893868716"/>
       </p:ext>
     </p:extLst>
   </p:cSld>
@@ -1453,15 +1640,7 @@
           <a:bodyPr/>
           <a:lstStyle/>
           <a:p>
-            <a:pPr marL="171450" indent="-171450">
-              <a:buFont typeface="Calibri" panose="020F0502020204030204" pitchFamily="34" charset="0"/>
-              <a:buChar char="―"/>
-            </a:pPr>
-            <a:r>
-              <a:rPr lang="en-US" dirty="0" smtClean="0"/>
-              <a:t>xx</a:t>
-            </a:r>
-            <a:endParaRPr lang="en-US" dirty="0"/>
+            <a:endParaRPr lang="en-US" sz="1400" dirty="0"/>
           </a:p>
         </p:txBody>
       </p:sp>
@@ -1491,7 +1670,7 @@
     </p:spTree>
     <p:extLst>
       <p:ext uri="{BB962C8B-B14F-4D97-AF65-F5344CB8AC3E}">
-        <p14:creationId xmlns:p14="http://schemas.microsoft.com/office/powerpoint/2010/main" val="3023141511"/>
+        <p14:creationId xmlns:p14="http://schemas.microsoft.com/office/powerpoint/2010/main" val="2893868716"/>
       </p:ext>
     </p:extLst>
   </p:cSld>
@@ -1545,28 +1724,11 @@
           <a:bodyPr/>
           <a:lstStyle/>
           <a:p>
-            <a:pPr marL="171450" marR="0" lvl="0" indent="-171450" algn="l" defTabSz="914400" rtl="0" eaLnBrk="1" fontAlgn="auto" latinLnBrk="0" hangingPunct="1">
-              <a:lnSpc>
-                <a:spcPct val="100000"/>
-              </a:lnSpc>
-              <a:spcBef>
-                <a:spcPts val="0"/>
-              </a:spcBef>
-              <a:spcAft>
-                <a:spcPts val="0"/>
-              </a:spcAft>
-              <a:buClrTx/>
-              <a:buSzTx/>
-              <a:buFont typeface="Calibri" panose="020F0502020204030204" pitchFamily="34" charset="0"/>
-              <a:buChar char="―"/>
-              <a:tabLst/>
-              <a:defRPr/>
-            </a:pPr>
-            <a:r>
-              <a:rPr lang="en-US" dirty="0" smtClean="0"/>
-              <a:t>Briefly talk about the documentation and video tutorials that our team is already in the process of developing</a:t>
-            </a:r>
-            <a:endParaRPr lang="en-US" dirty="0"/>
+            <a:r>
+              <a:rPr lang="en-US" sz="1400" dirty="0" smtClean="0"/>
+              <a:t>This solution is pretty much done as it is able to support the Create, Read, Update, and Delete functions with each registered user of the app.  We’re just working on the “Total Hours” function using a PHP script on the Volunteer Hours Report page and cleaning up the rest of the pages for our final presentation. </a:t>
+            </a:r>
+            <a:endParaRPr lang="en-US" sz="1400" dirty="0"/>
           </a:p>
         </p:txBody>
       </p:sp>
@@ -1596,7 +1758,7 @@
     </p:spTree>
     <p:extLst>
       <p:ext uri="{BB962C8B-B14F-4D97-AF65-F5344CB8AC3E}">
-        <p14:creationId xmlns:p14="http://schemas.microsoft.com/office/powerpoint/2010/main" val="350034120"/>
+        <p14:creationId xmlns:p14="http://schemas.microsoft.com/office/powerpoint/2010/main" val="1959515886"/>
       </p:ext>
     </p:extLst>
   </p:cSld>
@@ -1650,6 +1812,14 @@
           <a:bodyPr/>
           <a:lstStyle/>
           <a:p>
+            <a:pPr marL="171450" indent="-171450">
+              <a:buFont typeface="Calibri" panose="020F0502020204030204" pitchFamily="34" charset="0"/>
+              <a:buChar char="―"/>
+            </a:pPr>
+            <a:r>
+              <a:rPr lang="en-US" dirty="0" smtClean="0"/>
+              <a:t>xx</a:t>
+            </a:r>
             <a:endParaRPr lang="en-US" dirty="0"/>
           </a:p>
         </p:txBody>
@@ -1680,7 +1850,7 @@
     </p:spTree>
     <p:extLst>
       <p:ext uri="{BB962C8B-B14F-4D97-AF65-F5344CB8AC3E}">
-        <p14:creationId xmlns:p14="http://schemas.microsoft.com/office/powerpoint/2010/main" val="1363923469"/>
+        <p14:creationId xmlns:p14="http://schemas.microsoft.com/office/powerpoint/2010/main" val="3023141511"/>
       </p:ext>
     </p:extLst>
   </p:cSld>
@@ -1871,7 +2041,7 @@
           <a:p>
             <a:fld id="{14973A1A-3B12-4F13-9E45-4B4F2CF06D13}" type="datetimeFigureOut">
               <a:rPr lang="en-US" smtClean="0"/>
-              <a:t>3/26/2018</a:t>
+              <a:t>3/27/2018</a:t>
             </a:fld>
             <a:endParaRPr lang="en-US" dirty="0"/>
           </a:p>
@@ -2082,7 +2252,7 @@
           <a:p>
             <a:fld id="{14973A1A-3B12-4F13-9E45-4B4F2CF06D13}" type="datetimeFigureOut">
               <a:rPr lang="en-US" smtClean="0"/>
-              <a:t>3/26/2018</a:t>
+              <a:t>3/27/2018</a:t>
             </a:fld>
             <a:endParaRPr lang="en-US" dirty="0"/>
           </a:p>
@@ -2262,7 +2432,7 @@
           <a:p>
             <a:fld id="{14973A1A-3B12-4F13-9E45-4B4F2CF06D13}" type="datetimeFigureOut">
               <a:rPr lang="en-US" smtClean="0"/>
-              <a:t>3/26/2018</a:t>
+              <a:t>3/27/2018</a:t>
             </a:fld>
             <a:endParaRPr lang="en-US" dirty="0"/>
           </a:p>
@@ -2432,7 +2602,7 @@
           <a:p>
             <a:fld id="{14973A1A-3B12-4F13-9E45-4B4F2CF06D13}" type="datetimeFigureOut">
               <a:rPr lang="en-US" smtClean="0"/>
-              <a:t>3/26/2018</a:t>
+              <a:t>3/27/2018</a:t>
             </a:fld>
             <a:endParaRPr lang="en-US" dirty="0"/>
           </a:p>
@@ -2726,7 +2896,7 @@
           <a:p>
             <a:fld id="{14973A1A-3B12-4F13-9E45-4B4F2CF06D13}" type="datetimeFigureOut">
               <a:rPr lang="en-US" smtClean="0"/>
-              <a:t>3/26/2018</a:t>
+              <a:t>3/27/2018</a:t>
             </a:fld>
             <a:endParaRPr lang="en-US" dirty="0"/>
           </a:p>
@@ -3014,7 +3184,7 @@
           <a:p>
             <a:fld id="{14973A1A-3B12-4F13-9E45-4B4F2CF06D13}" type="datetimeFigureOut">
               <a:rPr lang="en-US" smtClean="0"/>
-              <a:t>3/26/2018</a:t>
+              <a:t>3/27/2018</a:t>
             </a:fld>
             <a:endParaRPr lang="en-US" dirty="0"/>
           </a:p>
@@ -3436,7 +3606,7 @@
           <a:p>
             <a:fld id="{14973A1A-3B12-4F13-9E45-4B4F2CF06D13}" type="datetimeFigureOut">
               <a:rPr lang="en-US" smtClean="0"/>
-              <a:t>3/26/2018</a:t>
+              <a:t>3/27/2018</a:t>
             </a:fld>
             <a:endParaRPr lang="en-US" dirty="0"/>
           </a:p>
@@ -3554,7 +3724,7 @@
           <a:p>
             <a:fld id="{14973A1A-3B12-4F13-9E45-4B4F2CF06D13}" type="datetimeFigureOut">
               <a:rPr lang="en-US" smtClean="0"/>
-              <a:t>3/26/2018</a:t>
+              <a:t>3/27/2018</a:t>
             </a:fld>
             <a:endParaRPr lang="en-US" dirty="0"/>
           </a:p>
@@ -3649,7 +3819,7 @@
           <a:p>
             <a:fld id="{14973A1A-3B12-4F13-9E45-4B4F2CF06D13}" type="datetimeFigureOut">
               <a:rPr lang="en-US" smtClean="0"/>
-              <a:t>3/26/2018</a:t>
+              <a:t>3/27/2018</a:t>
             </a:fld>
             <a:endParaRPr lang="en-US" dirty="0"/>
           </a:p>
@@ -3926,7 +4096,7 @@
           <a:p>
             <a:fld id="{14973A1A-3B12-4F13-9E45-4B4F2CF06D13}" type="datetimeFigureOut">
               <a:rPr lang="en-US" smtClean="0"/>
-              <a:t>3/26/2018</a:t>
+              <a:t>3/27/2018</a:t>
             </a:fld>
             <a:endParaRPr lang="en-US" dirty="0"/>
           </a:p>
@@ -4179,7 +4349,7 @@
           <a:p>
             <a:fld id="{14973A1A-3B12-4F13-9E45-4B4F2CF06D13}" type="datetimeFigureOut">
               <a:rPr lang="en-US" smtClean="0"/>
-              <a:t>3/26/2018</a:t>
+              <a:t>3/27/2018</a:t>
             </a:fld>
             <a:endParaRPr lang="en-US" dirty="0"/>
           </a:p>
@@ -4402,7 +4572,7 @@
           <a:p>
             <a:fld id="{14973A1A-3B12-4F13-9E45-4B4F2CF06D13}" type="datetimeFigureOut">
               <a:rPr lang="en-US" smtClean="0"/>
-              <a:t>3/26/2018</a:t>
+              <a:t>3/27/2018</a:t>
             </a:fld>
             <a:endParaRPr lang="en-US" dirty="0"/>
           </a:p>
@@ -5523,6 +5693,244 @@
         </p:nvSpPr>
         <p:spPr>
           <a:xfrm>
+            <a:off x="457200" y="76200"/>
+            <a:ext cx="8229600" cy="1143000"/>
+          </a:xfrm>
+        </p:spPr>
+        <p:txBody>
+          <a:bodyPr/>
+          <a:lstStyle/>
+          <a:p>
+            <a:pPr algn="l"/>
+            <a:r>
+              <a:rPr lang="en-US" b="1" dirty="0" smtClean="0"/>
+              <a:t>Next Tasks….</a:t>
+            </a:r>
+            <a:endParaRPr lang="en-US" b="1" dirty="0"/>
+          </a:p>
+        </p:txBody>
+      </p:sp>
+      <p:sp>
+        <p:nvSpPr>
+          <p:cNvPr id="3" name="Content Placeholder 2"/>
+          <p:cNvSpPr>
+            <a:spLocks noGrp="1"/>
+          </p:cNvSpPr>
+          <p:nvPr>
+            <p:ph idx="1"/>
+          </p:nvPr>
+        </p:nvSpPr>
+        <p:spPr>
+          <a:xfrm>
+            <a:off x="533400" y="1524000"/>
+            <a:ext cx="8382000" cy="4419600"/>
+          </a:xfrm>
+        </p:spPr>
+        <p:txBody>
+          <a:bodyPr>
+            <a:normAutofit/>
+          </a:bodyPr>
+          <a:lstStyle/>
+          <a:p>
+            <a:pPr>
+              <a:spcBef>
+                <a:spcPts val="1200"/>
+              </a:spcBef>
+            </a:pPr>
+            <a:r>
+              <a:rPr lang="en-US" dirty="0" smtClean="0"/>
+              <a:t>Finish Documentation &amp; Video Tutorials</a:t>
+            </a:r>
+          </a:p>
+          <a:p>
+            <a:pPr>
+              <a:spcBef>
+                <a:spcPts val="1200"/>
+              </a:spcBef>
+            </a:pPr>
+            <a:r>
+              <a:rPr lang="en-US" dirty="0" smtClean="0"/>
+              <a:t>Deploy Website &amp; App on ~April 4th</a:t>
+            </a:r>
+          </a:p>
+          <a:p>
+            <a:pPr>
+              <a:spcBef>
+                <a:spcPts val="1200"/>
+              </a:spcBef>
+            </a:pPr>
+            <a:r>
+              <a:rPr lang="en-US" dirty="0" smtClean="0"/>
+              <a:t>Schedule Training Session with Art</a:t>
+            </a:r>
+          </a:p>
+          <a:p>
+            <a:pPr>
+              <a:spcBef>
+                <a:spcPts val="1200"/>
+              </a:spcBef>
+            </a:pPr>
+            <a:r>
+              <a:rPr lang="en-US" dirty="0" smtClean="0"/>
+              <a:t>Set up Admin Reporting Site by Section</a:t>
+            </a:r>
+          </a:p>
+          <a:p>
+            <a:pPr lvl="1">
+              <a:spcBef>
+                <a:spcPts val="1200"/>
+              </a:spcBef>
+            </a:pPr>
+            <a:r>
+              <a:rPr lang="en-US" dirty="0" smtClean="0"/>
+              <a:t>SGW &amp; Hardman Farm</a:t>
+            </a:r>
+          </a:p>
+          <a:p>
+            <a:pPr lvl="1">
+              <a:spcBef>
+                <a:spcPts val="1200"/>
+              </a:spcBef>
+            </a:pPr>
+            <a:r>
+              <a:rPr lang="en-US" dirty="0" smtClean="0"/>
+              <a:t>PHPRunner Tool</a:t>
+            </a:r>
+          </a:p>
+          <a:p>
+            <a:pPr lvl="1">
+              <a:spcBef>
+                <a:spcPts val="1200"/>
+              </a:spcBef>
+            </a:pPr>
+            <a:endParaRPr lang="en-US" dirty="0" smtClean="0"/>
+          </a:p>
+          <a:p>
+            <a:pPr>
+              <a:spcBef>
+                <a:spcPts val="1200"/>
+              </a:spcBef>
+            </a:pPr>
+            <a:endParaRPr lang="en-US" dirty="0" smtClean="0"/>
+          </a:p>
+        </p:txBody>
+      </p:sp>
+    </p:spTree>
+    <p:extLst>
+      <p:ext uri="{BB962C8B-B14F-4D97-AF65-F5344CB8AC3E}">
+        <p14:creationId xmlns:p14="http://schemas.microsoft.com/office/powerpoint/2010/main" val="3818389730"/>
+      </p:ext>
+    </p:extLst>
+  </p:cSld>
+  <p:clrMapOvr>
+    <a:masterClrMapping/>
+  </p:clrMapOvr>
+  <p:timing>
+    <p:tnLst>
+      <p:par>
+        <p:cTn id="1" dur="indefinite" restart="never" nodeType="tmRoot"/>
+      </p:par>
+    </p:tnLst>
+  </p:timing>
+</p:sld>
+</file>
+
+<file path=ppt/slides/slide11.xml><?xml version="1.0" encoding="utf-8"?>
+<p:sld xmlns:a="http://schemas.openxmlformats.org/drawingml/2006/main" xmlns:r="http://schemas.openxmlformats.org/officeDocument/2006/relationships" xmlns:p="http://schemas.openxmlformats.org/presentationml/2006/main">
+  <p:cSld>
+    <p:spTree>
+      <p:nvGrpSpPr>
+        <p:cNvPr id="1" name=""/>
+        <p:cNvGrpSpPr/>
+        <p:nvPr/>
+      </p:nvGrpSpPr>
+      <p:grpSpPr>
+        <a:xfrm>
+          <a:off x="0" y="0"/>
+          <a:ext cx="0" cy="0"/>
+          <a:chOff x="0" y="0"/>
+          <a:chExt cx="0" cy="0"/>
+        </a:xfrm>
+      </p:grpSpPr>
+      <p:sp>
+        <p:nvSpPr>
+          <p:cNvPr id="2" name="Title 1"/>
+          <p:cNvSpPr>
+            <a:spLocks noGrp="1"/>
+          </p:cNvSpPr>
+          <p:nvPr>
+            <p:ph type="title"/>
+          </p:nvPr>
+        </p:nvSpPr>
+        <p:spPr>
+          <a:xfrm>
+            <a:off x="457200" y="2286000"/>
+            <a:ext cx="8229600" cy="1143000"/>
+          </a:xfrm>
+        </p:spPr>
+        <p:txBody>
+          <a:bodyPr>
+            <a:normAutofit/>
+          </a:bodyPr>
+          <a:lstStyle/>
+          <a:p>
+            <a:r>
+              <a:rPr lang="en-US" sz="5400" b="1" dirty="0" smtClean="0"/>
+              <a:t>Questions</a:t>
+            </a:r>
+            <a:endParaRPr lang="en-US" sz="5400" b="1" dirty="0"/>
+          </a:p>
+        </p:txBody>
+      </p:sp>
+    </p:spTree>
+    <p:extLst>
+      <p:ext uri="{BB962C8B-B14F-4D97-AF65-F5344CB8AC3E}">
+        <p14:creationId xmlns:p14="http://schemas.microsoft.com/office/powerpoint/2010/main" val="2461551364"/>
+      </p:ext>
+    </p:extLst>
+  </p:cSld>
+  <p:clrMapOvr>
+    <a:masterClrMapping/>
+  </p:clrMapOvr>
+  <p:timing>
+    <p:tnLst>
+      <p:par>
+        <p:cTn id="1" dur="indefinite" restart="never" nodeType="tmRoot"/>
+      </p:par>
+    </p:tnLst>
+  </p:timing>
+</p:sld>
+</file>
+
+<file path=ppt/slides/slide12.xml><?xml version="1.0" encoding="utf-8"?>
+<p:sld xmlns:a="http://schemas.openxmlformats.org/drawingml/2006/main" xmlns:r="http://schemas.openxmlformats.org/officeDocument/2006/relationships" xmlns:p="http://schemas.openxmlformats.org/presentationml/2006/main">
+  <p:cSld>
+    <p:spTree>
+      <p:nvGrpSpPr>
+        <p:cNvPr id="1" name=""/>
+        <p:cNvGrpSpPr/>
+        <p:nvPr/>
+      </p:nvGrpSpPr>
+      <p:grpSpPr>
+        <a:xfrm>
+          <a:off x="0" y="0"/>
+          <a:ext cx="0" cy="0"/>
+          <a:chOff x="0" y="0"/>
+          <a:chExt cx="0" cy="0"/>
+        </a:xfrm>
+      </p:grpSpPr>
+      <p:sp>
+        <p:nvSpPr>
+          <p:cNvPr id="2" name="Title 1"/>
+          <p:cNvSpPr>
+            <a:spLocks noGrp="1"/>
+          </p:cNvSpPr>
+          <p:nvPr>
+            <p:ph type="title"/>
+          </p:nvPr>
+        </p:nvSpPr>
+        <p:spPr>
+          <a:xfrm>
             <a:off x="457200" y="2286000"/>
             <a:ext cx="8229600" cy="1143000"/>
           </a:xfrm>
@@ -5561,7 +5969,7 @@
 </p:sld>
 </file>
 
-<file path=ppt/slides/slide11.xml><?xml version="1.0" encoding="utf-8"?>
+<file path=ppt/slides/slide13.xml><?xml version="1.0" encoding="utf-8"?>
 <p:sld xmlns:a="http://schemas.openxmlformats.org/drawingml/2006/main" xmlns:r="http://schemas.openxmlformats.org/officeDocument/2006/relationships" xmlns:p="http://schemas.openxmlformats.org/presentationml/2006/main">
   <p:cSld>
     <p:spTree>
@@ -5737,7 +6145,7 @@
 </p:sld>
 </file>
 
-<file path=ppt/slides/slide12.xml><?xml version="1.0" encoding="utf-8"?>
+<file path=ppt/slides/slide14.xml><?xml version="1.0" encoding="utf-8"?>
 <p:sld xmlns:a="http://schemas.openxmlformats.org/drawingml/2006/main" xmlns:r="http://schemas.openxmlformats.org/officeDocument/2006/relationships" xmlns:p="http://schemas.openxmlformats.org/presentationml/2006/main">
   <p:cSld>
     <p:spTree>
@@ -5939,7 +6347,7 @@
 </p:sld>
 </file>
 
-<file path=ppt/slides/slide13.xml><?xml version="1.0" encoding="utf-8"?>
+<file path=ppt/slides/slide15.xml><?xml version="1.0" encoding="utf-8"?>
 <p:sld xmlns:a="http://schemas.openxmlformats.org/drawingml/2006/main" xmlns:r="http://schemas.openxmlformats.org/officeDocument/2006/relationships" xmlns:p="http://schemas.openxmlformats.org/presentationml/2006/main">
   <p:cSld>
     <p:spTree>
@@ -6272,7 +6680,7 @@
         </p:nvSpPr>
         <p:spPr>
           <a:xfrm>
-            <a:off x="457200" y="1524000"/>
+            <a:off x="457200" y="1371600"/>
             <a:ext cx="8229600" cy="4876800"/>
           </a:xfrm>
         </p:spPr>
@@ -6284,8 +6692,20 @@
           <a:p>
             <a:r>
               <a:rPr lang="en-US" sz="3600" dirty="0" smtClean="0"/>
-              <a:t>Project Background</a:t>
-            </a:r>
+              <a:t>Project </a:t>
+            </a:r>
+            <a:r>
+              <a:rPr lang="en-US" sz="3600" dirty="0" smtClean="0"/>
+              <a:t>Background</a:t>
+            </a:r>
+          </a:p>
+          <a:p>
+            <a:pPr lvl="1"/>
+            <a:r>
+              <a:rPr lang="en-US" dirty="0" smtClean="0"/>
+              <a:t>Web Hosting Cost Comparison</a:t>
+            </a:r>
+            <a:endParaRPr lang="en-US" dirty="0" smtClean="0"/>
           </a:p>
           <a:p>
             <a:r>
@@ -6297,8 +6717,19 @@
           <a:p>
             <a:r>
               <a:rPr lang="en-US" sz="3600" dirty="0" smtClean="0"/>
-              <a:t>Test Plan</a:t>
-            </a:r>
+              <a:t>Test </a:t>
+            </a:r>
+            <a:r>
+              <a:rPr lang="en-US" sz="3600" dirty="0" smtClean="0"/>
+              <a:t>Plan</a:t>
+            </a:r>
+          </a:p>
+          <a:p>
+            <a:r>
+              <a:rPr lang="en-US" sz="3600" dirty="0" smtClean="0"/>
+              <a:t>Alternate Solution – App in WordPress</a:t>
+            </a:r>
+            <a:endParaRPr lang="en-US" sz="3600" dirty="0" smtClean="0"/>
           </a:p>
           <a:p>
             <a:r>
@@ -6393,12 +6824,12 @@
         <p:spPr>
           <a:xfrm>
             <a:off x="533400" y="1371600"/>
-            <a:ext cx="8382000" cy="5029200"/>
+            <a:ext cx="8382000" cy="5181600"/>
           </a:xfrm>
         </p:spPr>
         <p:txBody>
           <a:bodyPr>
-            <a:normAutofit lnSpcReduction="10000"/>
+            <a:normAutofit fontScale="92500"/>
           </a:bodyPr>
           <a:lstStyle/>
           <a:p>
@@ -6476,8 +6907,13 @@
             </a:pPr>
             <a:r>
               <a:rPr lang="en-US" dirty="0" smtClean="0"/>
-              <a:t>Site hosting either 1&amp;1.com or Bluehost</a:t>
-            </a:r>
+              <a:t>Continue using</a:t>
+            </a:r>
+            <a:r>
+              <a:rPr lang="en-US" dirty="0" smtClean="0"/>
+              <a:t> 1&amp;1.com web host (instead of Bluehost)</a:t>
+            </a:r>
+            <a:endParaRPr lang="en-US" dirty="0" smtClean="0"/>
           </a:p>
           <a:p>
             <a:pPr lvl="1">
@@ -6566,7 +7002,7 @@
             <a:pPr algn="l"/>
             <a:r>
               <a:rPr lang="en-US" sz="4300" b="1" dirty="0" smtClean="0"/>
-              <a:t>Site &amp; App Demo – Beta Version</a:t>
+              <a:t>Web Hosting Cost Comparison</a:t>
             </a:r>
             <a:endParaRPr lang="en-US" sz="4300" b="1" dirty="0"/>
           </a:p>
@@ -6584,7 +7020,7 @@
         </p:nvSpPr>
         <p:spPr>
           <a:xfrm>
-            <a:off x="533400" y="1066800"/>
+            <a:off x="533400" y="914400"/>
             <a:ext cx="8382000" cy="4572000"/>
           </a:xfrm>
         </p:spPr>
@@ -6596,19 +7032,553 @@
           <a:p>
             <a:pPr>
               <a:spcBef>
-                <a:spcPts val="1200"/>
+                <a:spcPts val="300"/>
               </a:spcBef>
             </a:pPr>
             <a:r>
               <a:rPr lang="en-US" dirty="0" smtClean="0"/>
-              <a:t>FSGW Site and Volunteer Hours App</a:t>
+              <a:t>1and1.com - $8.99/mo ($14.99 after 1yr)</a:t>
+            </a:r>
+          </a:p>
+          <a:p>
+            <a:pPr>
+              <a:spcBef>
+                <a:spcPts val="300"/>
+              </a:spcBef>
+            </a:pPr>
+            <a:r>
+              <a:rPr lang="en-US" dirty="0" smtClean="0"/>
+              <a:t>B</a:t>
+            </a:r>
+            <a:r>
+              <a:rPr lang="en-US" dirty="0" smtClean="0"/>
+              <a:t>luehost - $13.95/mo ($23.99 after 1yr)</a:t>
+            </a:r>
+            <a:endParaRPr lang="en-US" dirty="0"/>
+          </a:p>
+        </p:txBody>
+      </p:sp>
+      <p:pic>
+        <p:nvPicPr>
+          <p:cNvPr id="1026" name="Picture 2"/>
+          <p:cNvPicPr>
+            <a:picLocks noChangeAspect="1" noChangeArrowheads="1"/>
+          </p:cNvPicPr>
+          <p:nvPr/>
+        </p:nvPicPr>
+        <p:blipFill>
+          <a:blip r:embed="rId3">
+            <a:extLst>
+              <a:ext uri="{28A0092B-C50C-407E-A947-70E740481C1C}">
+                <a14:useLocalDpi xmlns:a14="http://schemas.microsoft.com/office/drawing/2010/main" val="0"/>
+              </a:ext>
+            </a:extLst>
+          </a:blip>
+          <a:srcRect/>
+          <a:stretch>
+            <a:fillRect/>
+          </a:stretch>
+        </p:blipFill>
+        <p:spPr bwMode="auto">
+          <a:xfrm>
+            <a:off x="76200" y="2133600"/>
+            <a:ext cx="4999191" cy="4693243"/>
+          </a:xfrm>
+          <a:prstGeom prst="rect">
+            <a:avLst/>
+          </a:prstGeom>
+          <a:noFill/>
+          <a:ln>
+            <a:noFill/>
+          </a:ln>
+          <a:extLst>
+            <a:ext uri="{909E8E84-426E-40DD-AFC4-6F175D3DCCD1}">
+              <a14:hiddenFill xmlns:a14="http://schemas.microsoft.com/office/drawing/2010/main">
+                <a:solidFill>
+                  <a:schemeClr val="accent1"/>
+                </a:solidFill>
+              </a14:hiddenFill>
+            </a:ext>
+            <a:ext uri="{91240B29-F687-4F45-9708-019B960494DF}">
+              <a14:hiddenLine xmlns:a14="http://schemas.microsoft.com/office/drawing/2010/main" w="9525">
+                <a:solidFill>
+                  <a:schemeClr val="tx1"/>
+                </a:solidFill>
+                <a:miter lim="800000"/>
+                <a:headEnd/>
+                <a:tailEnd/>
+              </a14:hiddenLine>
+            </a:ext>
+          </a:extLst>
+        </p:spPr>
+      </p:pic>
+      <p:pic>
+        <p:nvPicPr>
+          <p:cNvPr id="1027" name="Picture 3"/>
+          <p:cNvPicPr>
+            <a:picLocks noChangeAspect="1" noChangeArrowheads="1"/>
+          </p:cNvPicPr>
+          <p:nvPr/>
+        </p:nvPicPr>
+        <p:blipFill>
+          <a:blip r:embed="rId4">
+            <a:extLst>
+              <a:ext uri="{28A0092B-C50C-407E-A947-70E740481C1C}">
+                <a14:useLocalDpi xmlns:a14="http://schemas.microsoft.com/office/drawing/2010/main" val="0"/>
+              </a:ext>
+            </a:extLst>
+          </a:blip>
+          <a:srcRect/>
+          <a:stretch>
+            <a:fillRect/>
+          </a:stretch>
+        </p:blipFill>
+        <p:spPr bwMode="auto">
+          <a:xfrm>
+            <a:off x="5411241" y="2039439"/>
+            <a:ext cx="3656559" cy="4787403"/>
+          </a:xfrm>
+          <a:prstGeom prst="rect">
+            <a:avLst/>
+          </a:prstGeom>
+          <a:noFill/>
+          <a:ln>
+            <a:noFill/>
+          </a:ln>
+          <a:extLst>
+            <a:ext uri="{909E8E84-426E-40DD-AFC4-6F175D3DCCD1}">
+              <a14:hiddenFill xmlns:a14="http://schemas.microsoft.com/office/drawing/2010/main">
+                <a:solidFill>
+                  <a:schemeClr val="accent1"/>
+                </a:solidFill>
+              </a14:hiddenFill>
+            </a:ext>
+            <a:ext uri="{91240B29-F687-4F45-9708-019B960494DF}">
+              <a14:hiddenLine xmlns:a14="http://schemas.microsoft.com/office/drawing/2010/main" w="9525">
+                <a:solidFill>
+                  <a:schemeClr val="tx1"/>
+                </a:solidFill>
+                <a:miter lim="800000"/>
+                <a:headEnd/>
+                <a:tailEnd/>
+              </a14:hiddenLine>
+            </a:ext>
+          </a:extLst>
+        </p:spPr>
+      </p:pic>
+      <p:sp>
+        <p:nvSpPr>
+          <p:cNvPr id="4" name="Oval 3"/>
+          <p:cNvSpPr/>
+          <p:nvPr/>
+        </p:nvSpPr>
+        <p:spPr>
+          <a:xfrm>
+            <a:off x="3352800" y="2039438"/>
+            <a:ext cx="1905000" cy="1922961"/>
+          </a:xfrm>
+          <a:prstGeom prst="ellipse">
+            <a:avLst/>
+          </a:prstGeom>
+          <a:noFill/>
+          <a:ln>
+            <a:solidFill>
+              <a:srgbClr val="FF0000"/>
+            </a:solidFill>
+          </a:ln>
+        </p:spPr>
+        <p:style>
+          <a:lnRef idx="2">
+            <a:schemeClr val="accent2"/>
+          </a:lnRef>
+          <a:fillRef idx="1">
+            <a:schemeClr val="lt1"/>
+          </a:fillRef>
+          <a:effectRef idx="0">
+            <a:schemeClr val="accent2"/>
+          </a:effectRef>
+          <a:fontRef idx="minor">
+            <a:schemeClr val="dk1"/>
+          </a:fontRef>
+        </p:style>
+        <p:txBody>
+          <a:bodyPr rtlCol="0" anchor="ctr"/>
+          <a:lstStyle/>
+          <a:p>
+            <a:pPr algn="ctr"/>
+            <a:endParaRPr lang="en-US" dirty="0"/>
+          </a:p>
+        </p:txBody>
+      </p:sp>
+      <p:sp>
+        <p:nvSpPr>
+          <p:cNvPr id="11" name="Oval 10"/>
+          <p:cNvSpPr/>
+          <p:nvPr/>
+        </p:nvSpPr>
+        <p:spPr>
+          <a:xfrm>
+            <a:off x="5410200" y="5562600"/>
+            <a:ext cx="1447800" cy="1295400"/>
+          </a:xfrm>
+          <a:prstGeom prst="ellipse">
+            <a:avLst/>
+          </a:prstGeom>
+          <a:noFill/>
+          <a:ln>
+            <a:solidFill>
+              <a:srgbClr val="FF0000"/>
+            </a:solidFill>
+          </a:ln>
+        </p:spPr>
+        <p:style>
+          <a:lnRef idx="2">
+            <a:schemeClr val="accent2"/>
+          </a:lnRef>
+          <a:fillRef idx="1">
+            <a:schemeClr val="lt1"/>
+          </a:fillRef>
+          <a:effectRef idx="0">
+            <a:schemeClr val="accent2"/>
+          </a:effectRef>
+          <a:fontRef idx="minor">
+            <a:schemeClr val="dk1"/>
+          </a:fontRef>
+        </p:style>
+        <p:txBody>
+          <a:bodyPr rtlCol="0" anchor="ctr"/>
+          <a:lstStyle/>
+          <a:p>
+            <a:pPr algn="ctr"/>
+            <a:endParaRPr lang="en-US" dirty="0"/>
+          </a:p>
+        </p:txBody>
+      </p:sp>
+    </p:spTree>
+    <p:extLst>
+      <p:ext uri="{BB962C8B-B14F-4D97-AF65-F5344CB8AC3E}">
+        <p14:creationId xmlns:p14="http://schemas.microsoft.com/office/powerpoint/2010/main" val="3191406125"/>
+      </p:ext>
+    </p:extLst>
+  </p:cSld>
+  <p:clrMapOvr>
+    <a:masterClrMapping/>
+  </p:clrMapOvr>
+  <p:timing>
+    <p:tnLst>
+      <p:par>
+        <p:cTn id="1" dur="indefinite" restart="never" nodeType="tmRoot"/>
+      </p:par>
+    </p:tnLst>
+  </p:timing>
+</p:sld>
+</file>
+
+<file path=ppt/slides/slide5.xml><?xml version="1.0" encoding="utf-8"?>
+<p:sld xmlns:a="http://schemas.openxmlformats.org/drawingml/2006/main" xmlns:r="http://schemas.openxmlformats.org/officeDocument/2006/relationships" xmlns:p="http://schemas.openxmlformats.org/presentationml/2006/main">
+  <p:cSld>
+    <p:spTree>
+      <p:nvGrpSpPr>
+        <p:cNvPr id="1" name=""/>
+        <p:cNvGrpSpPr/>
+        <p:nvPr/>
+      </p:nvGrpSpPr>
+      <p:grpSpPr>
+        <a:xfrm>
+          <a:off x="0" y="0"/>
+          <a:ext cx="0" cy="0"/>
+          <a:chOff x="0" y="0"/>
+          <a:chExt cx="0" cy="0"/>
+        </a:xfrm>
+      </p:grpSpPr>
+      <p:sp>
+        <p:nvSpPr>
+          <p:cNvPr id="2" name="Title 1"/>
+          <p:cNvSpPr>
+            <a:spLocks noGrp="1"/>
+          </p:cNvSpPr>
+          <p:nvPr>
+            <p:ph type="title"/>
+          </p:nvPr>
+        </p:nvSpPr>
+        <p:spPr>
+          <a:xfrm>
+            <a:off x="457200" y="76200"/>
+            <a:ext cx="7772400" cy="1143000"/>
+          </a:xfrm>
+        </p:spPr>
+        <p:txBody>
+          <a:bodyPr>
+            <a:normAutofit/>
+          </a:bodyPr>
+          <a:lstStyle/>
+          <a:p>
+            <a:pPr algn="l"/>
+            <a:r>
+              <a:rPr lang="en-US" sz="4300" b="1" dirty="0" smtClean="0"/>
+              <a:t>Current Site/App</a:t>
+            </a:r>
+            <a:endParaRPr lang="en-US" sz="4300" b="1" dirty="0"/>
+          </a:p>
+        </p:txBody>
+      </p:sp>
+      <p:sp>
+        <p:nvSpPr>
+          <p:cNvPr id="3" name="Content Placeholder 2"/>
+          <p:cNvSpPr>
+            <a:spLocks noGrp="1"/>
+          </p:cNvSpPr>
+          <p:nvPr>
+            <p:ph idx="1"/>
+          </p:nvPr>
+        </p:nvSpPr>
+        <p:spPr>
+          <a:xfrm>
+            <a:off x="533400" y="1143000"/>
+            <a:ext cx="8382000" cy="4572000"/>
+          </a:xfrm>
+        </p:spPr>
+        <p:txBody>
+          <a:bodyPr>
+            <a:normAutofit/>
+          </a:bodyPr>
+          <a:lstStyle/>
+          <a:p>
+            <a:pPr>
+              <a:spcBef>
+                <a:spcPts val="600"/>
+              </a:spcBef>
+            </a:pPr>
+            <a:r>
+              <a:rPr lang="en-US" dirty="0" smtClean="0"/>
+              <a:t>Difficult to update page contents/images</a:t>
+            </a:r>
+          </a:p>
+          <a:p>
+            <a:pPr>
+              <a:spcBef>
+                <a:spcPts val="600"/>
+              </a:spcBef>
+            </a:pPr>
+            <a:r>
+              <a:rPr lang="en-US" dirty="0" smtClean="0"/>
+              <a:t>App breaks down with later versions of PHP</a:t>
+            </a:r>
+            <a:endParaRPr lang="en-US" dirty="0"/>
+          </a:p>
+        </p:txBody>
+      </p:sp>
+      <p:pic>
+        <p:nvPicPr>
+          <p:cNvPr id="7" name="Picture 4"/>
+          <p:cNvPicPr>
+            <a:picLocks noChangeAspect="1" noChangeArrowheads="1"/>
+          </p:cNvPicPr>
+          <p:nvPr/>
+        </p:nvPicPr>
+        <p:blipFill>
+          <a:blip r:embed="rId3">
+            <a:extLst>
+              <a:ext uri="{28A0092B-C50C-407E-A947-70E740481C1C}">
+                <a14:useLocalDpi xmlns:a14="http://schemas.microsoft.com/office/drawing/2010/main" val="0"/>
+              </a:ext>
+            </a:extLst>
+          </a:blip>
+          <a:srcRect/>
+          <a:stretch>
+            <a:fillRect/>
+          </a:stretch>
+        </p:blipFill>
+        <p:spPr bwMode="auto">
+          <a:xfrm>
+            <a:off x="76200" y="2514600"/>
+            <a:ext cx="4572000" cy="4109965"/>
+          </a:xfrm>
+          <a:prstGeom prst="rect">
+            <a:avLst/>
+          </a:prstGeom>
+          <a:noFill/>
+          <a:ln w="9525">
+            <a:solidFill>
+              <a:schemeClr val="tx1"/>
+            </a:solidFill>
+            <a:miter lim="800000"/>
+            <a:headEnd/>
+            <a:tailEnd/>
+          </a:ln>
+          <a:extLst>
+            <a:ext uri="{909E8E84-426E-40DD-AFC4-6F175D3DCCD1}">
+              <a14:hiddenFill xmlns:a14="http://schemas.microsoft.com/office/drawing/2010/main">
+                <a:solidFill>
+                  <a:schemeClr val="accent1"/>
+                </a:solidFill>
+              </a14:hiddenFill>
+            </a:ext>
+          </a:extLst>
+        </p:spPr>
+      </p:pic>
+      <p:pic>
+        <p:nvPicPr>
+          <p:cNvPr id="8" name="Picture 3"/>
+          <p:cNvPicPr>
+            <a:picLocks noChangeAspect="1" noChangeArrowheads="1"/>
+          </p:cNvPicPr>
+          <p:nvPr/>
+        </p:nvPicPr>
+        <p:blipFill>
+          <a:blip r:embed="rId4">
+            <a:extLst>
+              <a:ext uri="{28A0092B-C50C-407E-A947-70E740481C1C}">
+                <a14:useLocalDpi xmlns:a14="http://schemas.microsoft.com/office/drawing/2010/main" val="0"/>
+              </a:ext>
+            </a:extLst>
+          </a:blip>
+          <a:srcRect/>
+          <a:stretch>
+            <a:fillRect/>
+          </a:stretch>
+        </p:blipFill>
+        <p:spPr bwMode="auto">
+          <a:xfrm>
+            <a:off x="4724400" y="3181012"/>
+            <a:ext cx="4343400" cy="2560822"/>
+          </a:xfrm>
+          <a:prstGeom prst="rect">
+            <a:avLst/>
+          </a:prstGeom>
+          <a:noFill/>
+          <a:ln w="9525">
+            <a:solidFill>
+              <a:schemeClr val="tx1"/>
+            </a:solidFill>
+            <a:miter lim="800000"/>
+            <a:headEnd/>
+            <a:tailEnd/>
+          </a:ln>
+          <a:extLst>
+            <a:ext uri="{909E8E84-426E-40DD-AFC4-6F175D3DCCD1}">
+              <a14:hiddenFill xmlns:a14="http://schemas.microsoft.com/office/drawing/2010/main">
+                <a:solidFill>
+                  <a:schemeClr val="accent1"/>
+                </a:solidFill>
+              </a14:hiddenFill>
+            </a:ext>
+          </a:extLst>
+        </p:spPr>
+      </p:pic>
+    </p:spTree>
+    <p:extLst>
+      <p:ext uri="{BB962C8B-B14F-4D97-AF65-F5344CB8AC3E}">
+        <p14:creationId xmlns:p14="http://schemas.microsoft.com/office/powerpoint/2010/main" val="695640666"/>
+      </p:ext>
+    </p:extLst>
+  </p:cSld>
+  <p:clrMapOvr>
+    <a:masterClrMapping/>
+  </p:clrMapOvr>
+  <p:timing>
+    <p:tnLst>
+      <p:par>
+        <p:cTn id="1" dur="indefinite" restart="never" nodeType="tmRoot"/>
+      </p:par>
+    </p:tnLst>
+  </p:timing>
+</p:sld>
+</file>
+
+<file path=ppt/slides/slide6.xml><?xml version="1.0" encoding="utf-8"?>
+<p:sld xmlns:a="http://schemas.openxmlformats.org/drawingml/2006/main" xmlns:r="http://schemas.openxmlformats.org/officeDocument/2006/relationships" xmlns:p="http://schemas.openxmlformats.org/presentationml/2006/main">
+  <p:cSld>
+    <p:spTree>
+      <p:nvGrpSpPr>
+        <p:cNvPr id="1" name=""/>
+        <p:cNvGrpSpPr/>
+        <p:nvPr/>
+      </p:nvGrpSpPr>
+      <p:grpSpPr>
+        <a:xfrm>
+          <a:off x="0" y="0"/>
+          <a:ext cx="0" cy="0"/>
+          <a:chOff x="0" y="0"/>
+          <a:chExt cx="0" cy="0"/>
+        </a:xfrm>
+      </p:grpSpPr>
+      <p:sp>
+        <p:nvSpPr>
+          <p:cNvPr id="2" name="Title 1"/>
+          <p:cNvSpPr>
+            <a:spLocks noGrp="1"/>
+          </p:cNvSpPr>
+          <p:nvPr>
+            <p:ph type="title"/>
+          </p:nvPr>
+        </p:nvSpPr>
+        <p:spPr>
+          <a:xfrm>
+            <a:off x="457200" y="76200"/>
+            <a:ext cx="7772400" cy="1143000"/>
+          </a:xfrm>
+        </p:spPr>
+        <p:txBody>
+          <a:bodyPr>
+            <a:normAutofit/>
+          </a:bodyPr>
+          <a:lstStyle/>
+          <a:p>
+            <a:pPr algn="l"/>
+            <a:r>
+              <a:rPr lang="en-US" sz="4300" b="1" dirty="0" smtClean="0"/>
+              <a:t>Site &amp; App Demo – Beta Version</a:t>
+            </a:r>
+            <a:endParaRPr lang="en-US" sz="4300" b="1" dirty="0"/>
+          </a:p>
+        </p:txBody>
+      </p:sp>
+      <p:sp>
+        <p:nvSpPr>
+          <p:cNvPr id="3" name="Content Placeholder 2"/>
+          <p:cNvSpPr>
+            <a:spLocks noGrp="1"/>
+          </p:cNvSpPr>
+          <p:nvPr>
+            <p:ph idx="1"/>
+          </p:nvPr>
+        </p:nvSpPr>
+        <p:spPr>
+          <a:xfrm>
+            <a:off x="533400" y="990600"/>
+            <a:ext cx="8382000" cy="4572000"/>
+          </a:xfrm>
+        </p:spPr>
+        <p:txBody>
+          <a:bodyPr>
+            <a:normAutofit/>
+          </a:bodyPr>
+          <a:lstStyle/>
+          <a:p>
+            <a:pPr>
+              <a:spcBef>
+                <a:spcPts val="600"/>
+              </a:spcBef>
+            </a:pPr>
+            <a:r>
+              <a:rPr lang="en-US" dirty="0" smtClean="0"/>
+              <a:t>Improved</a:t>
+            </a:r>
+            <a:r>
+              <a:rPr lang="en-US" dirty="0" smtClean="0"/>
+              <a:t> </a:t>
+            </a:r>
+            <a:r>
+              <a:rPr lang="en-US" dirty="0" smtClean="0"/>
+              <a:t>Site and Volunteer Hours App</a:t>
             </a:r>
             <a:endParaRPr lang="en-US" dirty="0"/>
           </a:p>
           <a:p>
             <a:pPr lvl="1">
               <a:spcBef>
-                <a:spcPts val="1200"/>
+                <a:spcPts val="600"/>
               </a:spcBef>
             </a:pPr>
             <a:r>
@@ -6628,7 +7598,7 @@
           <a:p>
             <a:pPr lvl="1">
               <a:spcBef>
-                <a:spcPts val="1200"/>
+                <a:spcPts val="600"/>
               </a:spcBef>
             </a:pPr>
             <a:r>
@@ -6648,7 +7618,7 @@
           <a:p>
             <a:pPr lvl="1">
               <a:spcBef>
-                <a:spcPts val="1200"/>
+                <a:spcPts val="600"/>
               </a:spcBef>
             </a:pPr>
             <a:endParaRPr lang="en-US" dirty="0" smtClean="0"/>
@@ -6678,7 +7648,7 @@
         </p:blipFill>
         <p:spPr bwMode="auto">
           <a:xfrm>
-            <a:off x="3657600" y="3442003"/>
+            <a:off x="3810000" y="3276600"/>
             <a:ext cx="5181600" cy="2958797"/>
           </a:xfrm>
           <a:prstGeom prst="rect">
@@ -6727,8 +7697,8 @@
         </p:blipFill>
         <p:spPr bwMode="auto">
           <a:xfrm>
-            <a:off x="381000" y="2694130"/>
-            <a:ext cx="3048000" cy="4123928"/>
+            <a:off x="152400" y="2384835"/>
+            <a:ext cx="3505200" cy="4433223"/>
           </a:xfrm>
           <a:prstGeom prst="rect">
             <a:avLst/>
@@ -6761,7 +7731,7 @@
     </p:spTree>
     <p:extLst>
       <p:ext uri="{BB962C8B-B14F-4D97-AF65-F5344CB8AC3E}">
-        <p14:creationId xmlns:p14="http://schemas.microsoft.com/office/powerpoint/2010/main" val="3191406125"/>
+        <p14:creationId xmlns:p14="http://schemas.microsoft.com/office/powerpoint/2010/main" val="3294457425"/>
       </p:ext>
     </p:extLst>
   </p:cSld>
@@ -6778,7 +7748,7 @@
 </p:sld>
 </file>
 
-<file path=ppt/slides/slide5.xml><?xml version="1.0" encoding="utf-8"?>
+<file path=ppt/slides/slide7.xml><?xml version="1.0" encoding="utf-8"?>
 <p:sld xmlns:a="http://schemas.openxmlformats.org/drawingml/2006/main" xmlns:r="http://schemas.openxmlformats.org/officeDocument/2006/relationships" xmlns:p="http://schemas.openxmlformats.org/presentationml/2006/main">
   <p:cSld>
     <p:spTree>
@@ -7094,7 +8064,7 @@
 </p:sld>
 </file>
 
-<file path=ppt/slides/slide6.xml><?xml version="1.0" encoding="utf-8"?>
+<file path=ppt/slides/slide8.xml><?xml version="1.0" encoding="utf-8"?>
 <p:sld xmlns:a="http://schemas.openxmlformats.org/drawingml/2006/main" xmlns:r="http://schemas.openxmlformats.org/officeDocument/2006/relationships" xmlns:p="http://schemas.openxmlformats.org/presentationml/2006/main">
   <p:cSld>
     <p:spTree>
@@ -7171,11 +8141,7 @@
             </a:pPr>
             <a:r>
               <a:rPr lang="en-US" sz="3000" dirty="0" smtClean="0"/>
-              <a:t>Alternate Solution using free </a:t>
-            </a:r>
-            <a:r>
-              <a:rPr lang="en-US" sz="3000" dirty="0" smtClean="0"/>
-              <a:t>plugins</a:t>
+              <a:t>Alternate Solution using free plugins</a:t>
             </a:r>
           </a:p>
           <a:p>
@@ -7201,7 +8167,6 @@
               <a:rPr lang="en-US" sz="2200" dirty="0" smtClean="0"/>
               <a:t> </a:t>
             </a:r>
-            <a:endParaRPr lang="en-US" sz="2200" dirty="0" smtClean="0"/>
           </a:p>
         </p:txBody>
       </p:sp>
@@ -7372,7 +8337,7 @@
 </p:sld>
 </file>
 
-<file path=ppt/slides/slide7.xml><?xml version="1.0" encoding="utf-8"?>
+<file path=ppt/slides/slide9.xml><?xml version="1.0" encoding="utf-8"?>
 <p:sld xmlns:a="http://schemas.openxmlformats.org/drawingml/2006/main" xmlns:r="http://schemas.openxmlformats.org/officeDocument/2006/relationships" xmlns:p="http://schemas.openxmlformats.org/presentationml/2006/main">
   <p:cSld>
     <p:spTree>
@@ -7478,244 +8443,6 @@
     <p:extLst>
       <p:ext uri="{BB962C8B-B14F-4D97-AF65-F5344CB8AC3E}">
         <p14:creationId xmlns:p14="http://schemas.microsoft.com/office/powerpoint/2010/main" val="1063437470"/>
-      </p:ext>
-    </p:extLst>
-  </p:cSld>
-  <p:clrMapOvr>
-    <a:masterClrMapping/>
-  </p:clrMapOvr>
-  <p:timing>
-    <p:tnLst>
-      <p:par>
-        <p:cTn id="1" dur="indefinite" restart="never" nodeType="tmRoot"/>
-      </p:par>
-    </p:tnLst>
-  </p:timing>
-</p:sld>
-</file>
-
-<file path=ppt/slides/slide8.xml><?xml version="1.0" encoding="utf-8"?>
-<p:sld xmlns:a="http://schemas.openxmlformats.org/drawingml/2006/main" xmlns:r="http://schemas.openxmlformats.org/officeDocument/2006/relationships" xmlns:p="http://schemas.openxmlformats.org/presentationml/2006/main">
-  <p:cSld>
-    <p:spTree>
-      <p:nvGrpSpPr>
-        <p:cNvPr id="1" name=""/>
-        <p:cNvGrpSpPr/>
-        <p:nvPr/>
-      </p:nvGrpSpPr>
-      <p:grpSpPr>
-        <a:xfrm>
-          <a:off x="0" y="0"/>
-          <a:ext cx="0" cy="0"/>
-          <a:chOff x="0" y="0"/>
-          <a:chExt cx="0" cy="0"/>
-        </a:xfrm>
-      </p:grpSpPr>
-      <p:sp>
-        <p:nvSpPr>
-          <p:cNvPr id="2" name="Title 1"/>
-          <p:cNvSpPr>
-            <a:spLocks noGrp="1"/>
-          </p:cNvSpPr>
-          <p:nvPr>
-            <p:ph type="title"/>
-          </p:nvPr>
-        </p:nvSpPr>
-        <p:spPr>
-          <a:xfrm>
-            <a:off x="457200" y="76200"/>
-            <a:ext cx="8229600" cy="1143000"/>
-          </a:xfrm>
-        </p:spPr>
-        <p:txBody>
-          <a:bodyPr/>
-          <a:lstStyle/>
-          <a:p>
-            <a:pPr algn="l"/>
-            <a:r>
-              <a:rPr lang="en-US" b="1" dirty="0" smtClean="0"/>
-              <a:t>Next Tasks….</a:t>
-            </a:r>
-            <a:endParaRPr lang="en-US" b="1" dirty="0"/>
-          </a:p>
-        </p:txBody>
-      </p:sp>
-      <p:sp>
-        <p:nvSpPr>
-          <p:cNvPr id="3" name="Content Placeholder 2"/>
-          <p:cNvSpPr>
-            <a:spLocks noGrp="1"/>
-          </p:cNvSpPr>
-          <p:nvPr>
-            <p:ph idx="1"/>
-          </p:nvPr>
-        </p:nvSpPr>
-        <p:spPr>
-          <a:xfrm>
-            <a:off x="533400" y="1524000"/>
-            <a:ext cx="8382000" cy="4419600"/>
-          </a:xfrm>
-        </p:spPr>
-        <p:txBody>
-          <a:bodyPr>
-            <a:normAutofit/>
-          </a:bodyPr>
-          <a:lstStyle/>
-          <a:p>
-            <a:pPr>
-              <a:spcBef>
-                <a:spcPts val="1200"/>
-              </a:spcBef>
-            </a:pPr>
-            <a:r>
-              <a:rPr lang="en-US" dirty="0" smtClean="0"/>
-              <a:t>Finish Documentation &amp; Video Tutorials</a:t>
-            </a:r>
-          </a:p>
-          <a:p>
-            <a:pPr>
-              <a:spcBef>
-                <a:spcPts val="1200"/>
-              </a:spcBef>
-            </a:pPr>
-            <a:r>
-              <a:rPr lang="en-US" dirty="0" smtClean="0"/>
-              <a:t>Deploy Website &amp; App on ~April 4th</a:t>
-            </a:r>
-          </a:p>
-          <a:p>
-            <a:pPr>
-              <a:spcBef>
-                <a:spcPts val="1200"/>
-              </a:spcBef>
-            </a:pPr>
-            <a:r>
-              <a:rPr lang="en-US" dirty="0" smtClean="0"/>
-              <a:t>Schedule Training Session with Art</a:t>
-            </a:r>
-          </a:p>
-          <a:p>
-            <a:pPr>
-              <a:spcBef>
-                <a:spcPts val="1200"/>
-              </a:spcBef>
-            </a:pPr>
-            <a:r>
-              <a:rPr lang="en-US" dirty="0" smtClean="0"/>
-              <a:t>Set up Admin Reporting Site by Section</a:t>
-            </a:r>
-          </a:p>
-          <a:p>
-            <a:pPr lvl="1">
-              <a:spcBef>
-                <a:spcPts val="1200"/>
-              </a:spcBef>
-            </a:pPr>
-            <a:r>
-              <a:rPr lang="en-US" dirty="0" smtClean="0"/>
-              <a:t>SGW &amp; Hardman Farm</a:t>
-            </a:r>
-          </a:p>
-          <a:p>
-            <a:pPr lvl="1">
-              <a:spcBef>
-                <a:spcPts val="1200"/>
-              </a:spcBef>
-            </a:pPr>
-            <a:r>
-              <a:rPr lang="en-US" dirty="0" smtClean="0"/>
-              <a:t>PHPRunner Tool</a:t>
-            </a:r>
-          </a:p>
-          <a:p>
-            <a:pPr lvl="1">
-              <a:spcBef>
-                <a:spcPts val="1200"/>
-              </a:spcBef>
-            </a:pPr>
-            <a:endParaRPr lang="en-US" dirty="0" smtClean="0"/>
-          </a:p>
-          <a:p>
-            <a:pPr>
-              <a:spcBef>
-                <a:spcPts val="1200"/>
-              </a:spcBef>
-            </a:pPr>
-            <a:endParaRPr lang="en-US" dirty="0" smtClean="0"/>
-          </a:p>
-        </p:txBody>
-      </p:sp>
-    </p:spTree>
-    <p:extLst>
-      <p:ext uri="{BB962C8B-B14F-4D97-AF65-F5344CB8AC3E}">
-        <p14:creationId xmlns:p14="http://schemas.microsoft.com/office/powerpoint/2010/main" val="3818389730"/>
-      </p:ext>
-    </p:extLst>
-  </p:cSld>
-  <p:clrMapOvr>
-    <a:masterClrMapping/>
-  </p:clrMapOvr>
-  <p:timing>
-    <p:tnLst>
-      <p:par>
-        <p:cTn id="1" dur="indefinite" restart="never" nodeType="tmRoot"/>
-      </p:par>
-    </p:tnLst>
-  </p:timing>
-</p:sld>
-</file>
-
-<file path=ppt/slides/slide9.xml><?xml version="1.0" encoding="utf-8"?>
-<p:sld xmlns:a="http://schemas.openxmlformats.org/drawingml/2006/main" xmlns:r="http://schemas.openxmlformats.org/officeDocument/2006/relationships" xmlns:p="http://schemas.openxmlformats.org/presentationml/2006/main">
-  <p:cSld>
-    <p:spTree>
-      <p:nvGrpSpPr>
-        <p:cNvPr id="1" name=""/>
-        <p:cNvGrpSpPr/>
-        <p:nvPr/>
-      </p:nvGrpSpPr>
-      <p:grpSpPr>
-        <a:xfrm>
-          <a:off x="0" y="0"/>
-          <a:ext cx="0" cy="0"/>
-          <a:chOff x="0" y="0"/>
-          <a:chExt cx="0" cy="0"/>
-        </a:xfrm>
-      </p:grpSpPr>
-      <p:sp>
-        <p:nvSpPr>
-          <p:cNvPr id="2" name="Title 1"/>
-          <p:cNvSpPr>
-            <a:spLocks noGrp="1"/>
-          </p:cNvSpPr>
-          <p:nvPr>
-            <p:ph type="title"/>
-          </p:nvPr>
-        </p:nvSpPr>
-        <p:spPr>
-          <a:xfrm>
-            <a:off x="457200" y="2286000"/>
-            <a:ext cx="8229600" cy="1143000"/>
-          </a:xfrm>
-        </p:spPr>
-        <p:txBody>
-          <a:bodyPr>
-            <a:normAutofit/>
-          </a:bodyPr>
-          <a:lstStyle/>
-          <a:p>
-            <a:r>
-              <a:rPr lang="en-US" sz="5400" b="1" dirty="0" smtClean="0"/>
-              <a:t>Questions</a:t>
-            </a:r>
-            <a:endParaRPr lang="en-US" sz="5400" b="1" dirty="0"/>
-          </a:p>
-        </p:txBody>
-      </p:sp>
-    </p:spTree>
-    <p:extLst>
-      <p:ext uri="{BB962C8B-B14F-4D97-AF65-F5344CB8AC3E}">
-        <p14:creationId xmlns:p14="http://schemas.microsoft.com/office/powerpoint/2010/main" val="2461551364"/>
       </p:ext>
     </p:extLst>
   </p:cSld>

</xml_diff>